<commit_message>
Initial format layed out
Everyones work has been delegated. Time to get to work! 😎👍
</commit_message>
<xml_diff>
--- a/Group 2 Introductory Presentation.pptx
+++ b/Group 2 Introductory Presentation.pptx
@@ -5,14 +5,19 @@
     <p:sldMasterId id="2147483648" r:id="rId1"/>
   </p:sldMasterIdLst>
   <p:notesMasterIdLst>
-    <p:notesMasterId r:id="rId4"/>
+    <p:notesMasterId r:id="rId9"/>
   </p:notesMasterIdLst>
   <p:handoutMasterIdLst>
-    <p:handoutMasterId r:id="rId5"/>
+    <p:handoutMasterId r:id="rId10"/>
   </p:handoutMasterIdLst>
   <p:sldIdLst>
     <p:sldId id="256" r:id="rId2"/>
     <p:sldId id="265" r:id="rId3"/>
+    <p:sldId id="271" r:id="rId4"/>
+    <p:sldId id="266" r:id="rId5"/>
+    <p:sldId id="270" r:id="rId6"/>
+    <p:sldId id="272" r:id="rId7"/>
+    <p:sldId id="273" r:id="rId8"/>
   </p:sldIdLst>
   <p:sldSz cx="12192000" cy="6858000"/>
   <p:notesSz cx="6858000" cy="9144000"/>
@@ -131,6 +136,163 @@
     </p:ext>
   </p:extLst>
 </p:presentation>
+</file>
+
+<file path=ppt/changesInfos/changesInfo1.xml><?xml version="1.0" encoding="utf-8"?>
+<pc:chgInfo xmlns:a="http://schemas.openxmlformats.org/drawingml/2006/main" xmlns:r="http://schemas.openxmlformats.org/officeDocument/2006/relationships" xmlns:ac="http://schemas.microsoft.com/office/drawing/2013/main/command" xmlns:pc="http://schemas.microsoft.com/office/powerpoint/2013/main/command">
+  <pc:docChgLst>
+    <pc:chgData name="Stephen Behnke" userId="8cc806eab17d0c7e" providerId="LiveId" clId="{961B50DF-DFC0-4979-8ABB-6A69B32EB4EB}"/>
+    <pc:docChg chg="undo custSel addSld delSld modSld">
+      <pc:chgData name="Stephen Behnke" userId="8cc806eab17d0c7e" providerId="LiveId" clId="{961B50DF-DFC0-4979-8ABB-6A69B32EB4EB}" dt="2021-10-15T23:57:27.323" v="225" actId="20577"/>
+      <pc:docMkLst>
+        <pc:docMk/>
+      </pc:docMkLst>
+      <pc:sldChg chg="modSp mod">
+        <pc:chgData name="Stephen Behnke" userId="8cc806eab17d0c7e" providerId="LiveId" clId="{961B50DF-DFC0-4979-8ABB-6A69B32EB4EB}" dt="2021-10-15T23:52:48.118" v="140" actId="20577"/>
+        <pc:sldMkLst>
+          <pc:docMk/>
+          <pc:sldMk cId="3042826300" sldId="265"/>
+        </pc:sldMkLst>
+        <pc:spChg chg="mod">
+          <ac:chgData name="Stephen Behnke" userId="8cc806eab17d0c7e" providerId="LiveId" clId="{961B50DF-DFC0-4979-8ABB-6A69B32EB4EB}" dt="2021-10-15T23:52:48.118" v="140" actId="20577"/>
+          <ac:spMkLst>
+            <pc:docMk/>
+            <pc:sldMk cId="3042826300" sldId="265"/>
+            <ac:spMk id="13" creationId="{00000000-0000-0000-0000-000000000000}"/>
+          </ac:spMkLst>
+        </pc:spChg>
+        <pc:spChg chg="mod">
+          <ac:chgData name="Stephen Behnke" userId="8cc806eab17d0c7e" providerId="LiveId" clId="{961B50DF-DFC0-4979-8ABB-6A69B32EB4EB}" dt="2021-10-15T23:51:46.517" v="89" actId="20577"/>
+          <ac:spMkLst>
+            <pc:docMk/>
+            <pc:sldMk cId="3042826300" sldId="265"/>
+            <ac:spMk id="14" creationId="{00000000-0000-0000-0000-000000000000}"/>
+          </ac:spMkLst>
+        </pc:spChg>
+      </pc:sldChg>
+      <pc:sldChg chg="modSp new mod">
+        <pc:chgData name="Stephen Behnke" userId="8cc806eab17d0c7e" providerId="LiveId" clId="{961B50DF-DFC0-4979-8ABB-6A69B32EB4EB}" dt="2021-10-15T23:51:54.035" v="105" actId="20577"/>
+        <pc:sldMkLst>
+          <pc:docMk/>
+          <pc:sldMk cId="4226687088" sldId="266"/>
+        </pc:sldMkLst>
+        <pc:spChg chg="mod">
+          <ac:chgData name="Stephen Behnke" userId="8cc806eab17d0c7e" providerId="LiveId" clId="{961B50DF-DFC0-4979-8ABB-6A69B32EB4EB}" dt="2021-10-15T23:51:54.035" v="105" actId="20577"/>
+          <ac:spMkLst>
+            <pc:docMk/>
+            <pc:sldMk cId="4226687088" sldId="266"/>
+            <ac:spMk id="2" creationId="{C64FC370-064A-4BFB-AE32-51EBB76E51D0}"/>
+          </ac:spMkLst>
+        </pc:spChg>
+      </pc:sldChg>
+      <pc:sldChg chg="new del">
+        <pc:chgData name="Stephen Behnke" userId="8cc806eab17d0c7e" providerId="LiveId" clId="{961B50DF-DFC0-4979-8ABB-6A69B32EB4EB}" dt="2021-10-15T23:53:48.993" v="141" actId="47"/>
+        <pc:sldMkLst>
+          <pc:docMk/>
+          <pc:sldMk cId="1629812092" sldId="267"/>
+        </pc:sldMkLst>
+      </pc:sldChg>
+      <pc:sldChg chg="new del">
+        <pc:chgData name="Stephen Behnke" userId="8cc806eab17d0c7e" providerId="LiveId" clId="{961B50DF-DFC0-4979-8ABB-6A69B32EB4EB}" dt="2021-10-15T23:53:50.203" v="142" actId="47"/>
+        <pc:sldMkLst>
+          <pc:docMk/>
+          <pc:sldMk cId="693804656" sldId="268"/>
+        </pc:sldMkLst>
+      </pc:sldChg>
+      <pc:sldChg chg="new del">
+        <pc:chgData name="Stephen Behnke" userId="8cc806eab17d0c7e" providerId="LiveId" clId="{961B50DF-DFC0-4979-8ABB-6A69B32EB4EB}" dt="2021-10-15T23:53:51.079" v="143" actId="47"/>
+        <pc:sldMkLst>
+          <pc:docMk/>
+          <pc:sldMk cId="3214678800" sldId="269"/>
+        </pc:sldMkLst>
+      </pc:sldChg>
+      <pc:sldChg chg="modSp new mod">
+        <pc:chgData name="Stephen Behnke" userId="8cc806eab17d0c7e" providerId="LiveId" clId="{961B50DF-DFC0-4979-8ABB-6A69B32EB4EB}" dt="2021-10-15T23:54:44.984" v="148" actId="20577"/>
+        <pc:sldMkLst>
+          <pc:docMk/>
+          <pc:sldMk cId="2220903198" sldId="270"/>
+        </pc:sldMkLst>
+        <pc:spChg chg="mod">
+          <ac:chgData name="Stephen Behnke" userId="8cc806eab17d0c7e" providerId="LiveId" clId="{961B50DF-DFC0-4979-8ABB-6A69B32EB4EB}" dt="2021-10-15T23:54:28.466" v="145" actId="20577"/>
+          <ac:spMkLst>
+            <pc:docMk/>
+            <pc:sldMk cId="2220903198" sldId="270"/>
+            <ac:spMk id="2" creationId="{781557B2-2FDD-492C-B3A1-89B6EF9BB98C}"/>
+          </ac:spMkLst>
+        </pc:spChg>
+        <pc:spChg chg="mod">
+          <ac:chgData name="Stephen Behnke" userId="8cc806eab17d0c7e" providerId="LiveId" clId="{961B50DF-DFC0-4979-8ABB-6A69B32EB4EB}" dt="2021-10-15T23:54:44.984" v="148" actId="20577"/>
+          <ac:spMkLst>
+            <pc:docMk/>
+            <pc:sldMk cId="2220903198" sldId="270"/>
+            <ac:spMk id="3" creationId="{5B311A54-7774-4D5D-A865-D395DE1ACF90}"/>
+          </ac:spMkLst>
+        </pc:spChg>
+      </pc:sldChg>
+      <pc:sldChg chg="modSp new mod">
+        <pc:chgData name="Stephen Behnke" userId="8cc806eab17d0c7e" providerId="LiveId" clId="{961B50DF-DFC0-4979-8ABB-6A69B32EB4EB}" dt="2021-10-15T23:52:03.068" v="123" actId="20577"/>
+        <pc:sldMkLst>
+          <pc:docMk/>
+          <pc:sldMk cId="1444804413" sldId="271"/>
+        </pc:sldMkLst>
+        <pc:spChg chg="mod">
+          <ac:chgData name="Stephen Behnke" userId="8cc806eab17d0c7e" providerId="LiveId" clId="{961B50DF-DFC0-4979-8ABB-6A69B32EB4EB}" dt="2021-10-15T23:52:03.068" v="123" actId="20577"/>
+          <ac:spMkLst>
+            <pc:docMk/>
+            <pc:sldMk cId="1444804413" sldId="271"/>
+            <ac:spMk id="2" creationId="{340A77AB-528D-4FFF-A8BF-173690077639}"/>
+          </ac:spMkLst>
+        </pc:spChg>
+      </pc:sldChg>
+      <pc:sldChg chg="modSp new mod">
+        <pc:chgData name="Stephen Behnke" userId="8cc806eab17d0c7e" providerId="LiveId" clId="{961B50DF-DFC0-4979-8ABB-6A69B32EB4EB}" dt="2021-10-15T23:57:07.700" v="184" actId="20577"/>
+        <pc:sldMkLst>
+          <pc:docMk/>
+          <pc:sldMk cId="309347661" sldId="272"/>
+        </pc:sldMkLst>
+        <pc:spChg chg="mod">
+          <ac:chgData name="Stephen Behnke" userId="8cc806eab17d0c7e" providerId="LiveId" clId="{961B50DF-DFC0-4979-8ABB-6A69B32EB4EB}" dt="2021-10-15T23:55:11.896" v="167" actId="20577"/>
+          <ac:spMkLst>
+            <pc:docMk/>
+            <pc:sldMk cId="309347661" sldId="272"/>
+            <ac:spMk id="2" creationId="{0C7A1735-0AE2-48F6-BBB8-054C1E3726F0}"/>
+          </ac:spMkLst>
+        </pc:spChg>
+        <pc:spChg chg="mod">
+          <ac:chgData name="Stephen Behnke" userId="8cc806eab17d0c7e" providerId="LiveId" clId="{961B50DF-DFC0-4979-8ABB-6A69B32EB4EB}" dt="2021-10-15T23:57:07.700" v="184" actId="20577"/>
+          <ac:spMkLst>
+            <pc:docMk/>
+            <pc:sldMk cId="309347661" sldId="272"/>
+            <ac:spMk id="3" creationId="{DC75FD96-9EEF-4A2B-87B6-CC4B48F67548}"/>
+          </ac:spMkLst>
+        </pc:spChg>
+      </pc:sldChg>
+      <pc:sldChg chg="modSp new mod">
+        <pc:chgData name="Stephen Behnke" userId="8cc806eab17d0c7e" providerId="LiveId" clId="{961B50DF-DFC0-4979-8ABB-6A69B32EB4EB}" dt="2021-10-15T23:57:27.323" v="225" actId="20577"/>
+        <pc:sldMkLst>
+          <pc:docMk/>
+          <pc:sldMk cId="271590805" sldId="273"/>
+        </pc:sldMkLst>
+        <pc:spChg chg="mod">
+          <ac:chgData name="Stephen Behnke" userId="8cc806eab17d0c7e" providerId="LiveId" clId="{961B50DF-DFC0-4979-8ABB-6A69B32EB4EB}" dt="2021-10-15T23:57:14.274" v="199" actId="20577"/>
+          <ac:spMkLst>
+            <pc:docMk/>
+            <pc:sldMk cId="271590805" sldId="273"/>
+            <ac:spMk id="2" creationId="{A02A87B9-A947-47EA-AFCC-801325E43868}"/>
+          </ac:spMkLst>
+        </pc:spChg>
+        <pc:spChg chg="mod">
+          <ac:chgData name="Stephen Behnke" userId="8cc806eab17d0c7e" providerId="LiveId" clId="{961B50DF-DFC0-4979-8ABB-6A69B32EB4EB}" dt="2021-10-15T23:57:27.323" v="225" actId="20577"/>
+          <ac:spMkLst>
+            <pc:docMk/>
+            <pc:sldMk cId="271590805" sldId="273"/>
+            <ac:spMk id="3" creationId="{E36B15B4-F193-46AF-8E0A-4B003EFBC8E3}"/>
+          </ac:spMkLst>
+        </pc:spChg>
+      </pc:sldChg>
+    </pc:docChg>
+  </pc:docChgLst>
+</pc:chgInfo>
 </file>
 
 <file path=ppt/handoutMasters/handoutMaster1.xml><?xml version="1.0" encoding="utf-8"?>
@@ -3816,6 +3978,10 @@
           <a:bodyPr/>
           <a:lstStyle/>
           <a:p>
+            <a:r>
+              <a:rPr lang="en-US" dirty="0"/>
+              <a:t>Product Rationale</a:t>
+            </a:r>
             <a:endParaRPr dirty="0"/>
           </a:p>
         </p:txBody>
@@ -3832,13 +3998,162 @@
         </p:nvSpPr>
         <p:spPr/>
         <p:txBody>
-          <a:bodyPr/>
+          <a:bodyPr>
+            <a:normAutofit/>
+          </a:bodyPr>
           <a:lstStyle/>
           <a:p>
             <a:pPr marL="0" indent="0">
               <a:buNone/>
             </a:pPr>
-            <a:endParaRPr dirty="0"/>
+            <a:endParaRPr lang="en-US" sz="1800" dirty="0">
+              <a:latin typeface="Cambria" panose="02040503050406030204" pitchFamily="18" charset="0"/>
+              <a:ea typeface="Calibri" panose="020F0502020204030204" pitchFamily="34" charset="0"/>
+              <a:cs typeface="Times New Roman" panose="02020603050405020304" pitchFamily="18" charset="0"/>
+            </a:endParaRPr>
+          </a:p>
+          <a:p>
+            <a:pPr marL="0" indent="0">
+              <a:buNone/>
+            </a:pPr>
+            <a:r>
+              <a:rPr lang="en-US" dirty="0">
+                <a:effectLst/>
+                <a:latin typeface="Cambria" panose="02040503050406030204" pitchFamily="18" charset="0"/>
+                <a:ea typeface="Calibri" panose="020F0502020204030204" pitchFamily="34" charset="0"/>
+                <a:cs typeface="Times New Roman" panose="02020603050405020304" pitchFamily="18" charset="0"/>
+              </a:rPr>
+              <a:t>Our product is a software that makes it easy to make scripts in </a:t>
+            </a:r>
+            <a:r>
+              <a:rPr lang="en-US" dirty="0" err="1">
+                <a:effectLst/>
+                <a:latin typeface="Cambria" panose="02040503050406030204" pitchFamily="18" charset="0"/>
+                <a:ea typeface="Calibri" panose="020F0502020204030204" pitchFamily="34" charset="0"/>
+                <a:cs typeface="Times New Roman" panose="02020603050405020304" pitchFamily="18" charset="0"/>
+              </a:rPr>
+              <a:t>AutoHotKey</a:t>
+            </a:r>
+            <a:r>
+              <a:rPr lang="en-US" dirty="0">
+                <a:effectLst/>
+                <a:latin typeface="Cambria" panose="02040503050406030204" pitchFamily="18" charset="0"/>
+                <a:ea typeface="Calibri" panose="020F0502020204030204" pitchFamily="34" charset="0"/>
+                <a:cs typeface="Times New Roman" panose="02020603050405020304" pitchFamily="18" charset="0"/>
+              </a:rPr>
+              <a:t>, a scripting language. </a:t>
+            </a:r>
+            <a:r>
+              <a:rPr lang="en-US" b="1" dirty="0">
+                <a:effectLst/>
+                <a:latin typeface="Cambria" panose="02040503050406030204" pitchFamily="18" charset="0"/>
+                <a:ea typeface="Calibri" panose="020F0502020204030204" pitchFamily="34" charset="0"/>
+                <a:cs typeface="Times New Roman" panose="02020603050405020304" pitchFamily="18" charset="0"/>
+              </a:rPr>
+              <a:t>Our target audience</a:t>
+            </a:r>
+            <a:r>
+              <a:rPr lang="en-US" dirty="0">
+                <a:effectLst/>
+                <a:latin typeface="Cambria" panose="02040503050406030204" pitchFamily="18" charset="0"/>
+                <a:ea typeface="Calibri" panose="020F0502020204030204" pitchFamily="34" charset="0"/>
+                <a:cs typeface="Times New Roman" panose="02020603050405020304" pitchFamily="18" charset="0"/>
+              </a:rPr>
+              <a:t> is anyone who has work that requires doing repetitive tasks on computers, but who are not great with computers. </a:t>
+            </a:r>
+            <a:r>
+              <a:rPr lang="en-US" b="1" dirty="0">
+                <a:effectLst/>
+                <a:latin typeface="Cambria" panose="02040503050406030204" pitchFamily="18" charset="0"/>
+                <a:ea typeface="Calibri" panose="020F0502020204030204" pitchFamily="34" charset="0"/>
+                <a:cs typeface="Times New Roman" panose="02020603050405020304" pitchFamily="18" charset="0"/>
+              </a:rPr>
+              <a:t>The problem with</a:t>
+            </a:r>
+            <a:r>
+              <a:rPr lang="en-US" dirty="0">
+                <a:effectLst/>
+                <a:latin typeface="Cambria" panose="02040503050406030204" pitchFamily="18" charset="0"/>
+                <a:ea typeface="Calibri" panose="020F0502020204030204" pitchFamily="34" charset="0"/>
+                <a:cs typeface="Times New Roman" panose="02020603050405020304" pitchFamily="18" charset="0"/>
+              </a:rPr>
+              <a:t> </a:t>
+            </a:r>
+            <a:r>
+              <a:rPr lang="en-US" dirty="0" err="1">
+                <a:effectLst/>
+                <a:latin typeface="Cambria" panose="02040503050406030204" pitchFamily="18" charset="0"/>
+                <a:ea typeface="Calibri" panose="020F0502020204030204" pitchFamily="34" charset="0"/>
+                <a:cs typeface="Times New Roman" panose="02020603050405020304" pitchFamily="18" charset="0"/>
+              </a:rPr>
+              <a:t>AutoHotKey</a:t>
+            </a:r>
+            <a:r>
+              <a:rPr lang="en-US" dirty="0">
+                <a:effectLst/>
+                <a:latin typeface="Cambria" panose="02040503050406030204" pitchFamily="18" charset="0"/>
+                <a:ea typeface="Calibri" panose="020F0502020204030204" pitchFamily="34" charset="0"/>
+                <a:cs typeface="Times New Roman" panose="02020603050405020304" pitchFamily="18" charset="0"/>
+              </a:rPr>
+              <a:t> is that inexperienced people are intimidated by coding and so they never get to experience the power of </a:t>
+            </a:r>
+            <a:r>
+              <a:rPr lang="en-US" dirty="0" err="1">
+                <a:effectLst/>
+                <a:latin typeface="Cambria" panose="02040503050406030204" pitchFamily="18" charset="0"/>
+                <a:ea typeface="Calibri" panose="020F0502020204030204" pitchFamily="34" charset="0"/>
+                <a:cs typeface="Times New Roman" panose="02020603050405020304" pitchFamily="18" charset="0"/>
+              </a:rPr>
+              <a:t>AutoHotKey</a:t>
+            </a:r>
+            <a:r>
+              <a:rPr lang="en-US" dirty="0">
+                <a:effectLst/>
+                <a:latin typeface="Cambria" panose="02040503050406030204" pitchFamily="18" charset="0"/>
+                <a:ea typeface="Calibri" panose="020F0502020204030204" pitchFamily="34" charset="0"/>
+                <a:cs typeface="Times New Roman" panose="02020603050405020304" pitchFamily="18" charset="0"/>
+              </a:rPr>
+              <a:t> in their daily lives. Our product </a:t>
+            </a:r>
+            <a:r>
+              <a:rPr lang="en-US" b="1" dirty="0">
+                <a:effectLst/>
+                <a:latin typeface="Cambria" panose="02040503050406030204" pitchFamily="18" charset="0"/>
+                <a:ea typeface="Calibri" panose="020F0502020204030204" pitchFamily="34" charset="0"/>
+                <a:cs typeface="Times New Roman" panose="02020603050405020304" pitchFamily="18" charset="0"/>
+              </a:rPr>
+              <a:t>solves</a:t>
+            </a:r>
+            <a:r>
+              <a:rPr lang="en-US" dirty="0">
+                <a:effectLst/>
+                <a:latin typeface="Cambria" panose="02040503050406030204" pitchFamily="18" charset="0"/>
+                <a:ea typeface="Calibri" panose="020F0502020204030204" pitchFamily="34" charset="0"/>
+                <a:cs typeface="Times New Roman" panose="02020603050405020304" pitchFamily="18" charset="0"/>
+              </a:rPr>
+              <a:t> </a:t>
+            </a:r>
+            <a:r>
+              <a:rPr lang="en-US" b="1" dirty="0">
+                <a:effectLst/>
+                <a:latin typeface="Cambria" panose="02040503050406030204" pitchFamily="18" charset="0"/>
+                <a:ea typeface="Calibri" panose="020F0502020204030204" pitchFamily="34" charset="0"/>
+                <a:cs typeface="Times New Roman" panose="02020603050405020304" pitchFamily="18" charset="0"/>
+              </a:rPr>
+              <a:t>this problem</a:t>
+            </a:r>
+            <a:r>
+              <a:rPr lang="en-US" dirty="0">
+                <a:effectLst/>
+                <a:latin typeface="Cambria" panose="02040503050406030204" pitchFamily="18" charset="0"/>
+                <a:ea typeface="Calibri" panose="020F0502020204030204" pitchFamily="34" charset="0"/>
+                <a:cs typeface="Times New Roman" panose="02020603050405020304" pitchFamily="18" charset="0"/>
+              </a:rPr>
+              <a:t> by turning scripting into a task that’s as easy to do as clicking a button. </a:t>
+            </a:r>
+            <a:endParaRPr lang="en-US" dirty="0">
+              <a:latin typeface="Harlow Solid Italic" panose="04030604020F02020D02" pitchFamily="82" charset="0"/>
+            </a:endParaRPr>
           </a:p>
         </p:txBody>
       </p:sp>
@@ -3846,6 +4161,447 @@
     <p:extLst>
       <p:ext uri="{BB962C8B-B14F-4D97-AF65-F5344CB8AC3E}">
         <p14:creationId xmlns:p14="http://schemas.microsoft.com/office/powerpoint/2010/main" val="3042826300"/>
+      </p:ext>
+    </p:extLst>
+  </p:cSld>
+  <p:clrMapOvr>
+    <a:masterClrMapping/>
+  </p:clrMapOvr>
+</p:sld>
+</file>
+
+<file path=ppt/slides/slide3.xml><?xml version="1.0" encoding="utf-8"?>
+<p:sld xmlns:a="http://schemas.openxmlformats.org/drawingml/2006/main" xmlns:r="http://schemas.openxmlformats.org/officeDocument/2006/relationships" xmlns:p="http://schemas.openxmlformats.org/presentationml/2006/main">
+  <p:cSld>
+    <p:spTree>
+      <p:nvGrpSpPr>
+        <p:cNvPr id="1" name=""/>
+        <p:cNvGrpSpPr/>
+        <p:nvPr/>
+      </p:nvGrpSpPr>
+      <p:grpSpPr>
+        <a:xfrm>
+          <a:off x="0" y="0"/>
+          <a:ext cx="0" cy="0"/>
+          <a:chOff x="0" y="0"/>
+          <a:chExt cx="0" cy="0"/>
+        </a:xfrm>
+      </p:grpSpPr>
+      <p:sp>
+        <p:nvSpPr>
+          <p:cNvPr id="2" name="Title 1">
+            <a:extLst>
+              <a:ext uri="{FF2B5EF4-FFF2-40B4-BE49-F238E27FC236}">
+                <a16:creationId xmlns:a16="http://schemas.microsoft.com/office/drawing/2014/main" id="{340A77AB-528D-4FFF-A8BF-173690077639}"/>
+              </a:ext>
+            </a:extLst>
+          </p:cNvPr>
+          <p:cNvSpPr>
+            <a:spLocks noGrp="1"/>
+          </p:cNvSpPr>
+          <p:nvPr>
+            <p:ph type="title"/>
+          </p:nvPr>
+        </p:nvSpPr>
+        <p:spPr/>
+        <p:txBody>
+          <a:bodyPr/>
+          <a:lstStyle/>
+          <a:p>
+            <a:r>
+              <a:rPr lang="en-US" dirty="0"/>
+              <a:t>Feature Breakdown</a:t>
+            </a:r>
+          </a:p>
+        </p:txBody>
+      </p:sp>
+      <p:sp>
+        <p:nvSpPr>
+          <p:cNvPr id="3" name="Content Placeholder 2">
+            <a:extLst>
+              <a:ext uri="{FF2B5EF4-FFF2-40B4-BE49-F238E27FC236}">
+                <a16:creationId xmlns:a16="http://schemas.microsoft.com/office/drawing/2014/main" id="{70B04C1C-E350-470F-9F3E-89A0C0DEBEAE}"/>
+              </a:ext>
+            </a:extLst>
+          </p:cNvPr>
+          <p:cNvSpPr>
+            <a:spLocks noGrp="1"/>
+          </p:cNvSpPr>
+          <p:nvPr>
+            <p:ph idx="1"/>
+          </p:nvPr>
+        </p:nvSpPr>
+        <p:spPr/>
+        <p:txBody>
+          <a:bodyPr/>
+          <a:lstStyle/>
+          <a:p>
+            <a:endParaRPr lang="en-US" dirty="0"/>
+          </a:p>
+        </p:txBody>
+      </p:sp>
+    </p:spTree>
+    <p:extLst>
+      <p:ext uri="{BB962C8B-B14F-4D97-AF65-F5344CB8AC3E}">
+        <p14:creationId xmlns:p14="http://schemas.microsoft.com/office/powerpoint/2010/main" val="1444804413"/>
+      </p:ext>
+    </p:extLst>
+  </p:cSld>
+  <p:clrMapOvr>
+    <a:masterClrMapping/>
+  </p:clrMapOvr>
+</p:sld>
+</file>
+
+<file path=ppt/slides/slide4.xml><?xml version="1.0" encoding="utf-8"?>
+<p:sld xmlns:a="http://schemas.openxmlformats.org/drawingml/2006/main" xmlns:r="http://schemas.openxmlformats.org/officeDocument/2006/relationships" xmlns:p="http://schemas.openxmlformats.org/presentationml/2006/main">
+  <p:cSld>
+    <p:spTree>
+      <p:nvGrpSpPr>
+        <p:cNvPr id="1" name=""/>
+        <p:cNvGrpSpPr/>
+        <p:nvPr/>
+      </p:nvGrpSpPr>
+      <p:grpSpPr>
+        <a:xfrm>
+          <a:off x="0" y="0"/>
+          <a:ext cx="0" cy="0"/>
+          <a:chOff x="0" y="0"/>
+          <a:chExt cx="0" cy="0"/>
+        </a:xfrm>
+      </p:grpSpPr>
+      <p:sp>
+        <p:nvSpPr>
+          <p:cNvPr id="2" name="Title 1">
+            <a:extLst>
+              <a:ext uri="{FF2B5EF4-FFF2-40B4-BE49-F238E27FC236}">
+                <a16:creationId xmlns:a16="http://schemas.microsoft.com/office/drawing/2014/main" id="{C64FC370-064A-4BFB-AE32-51EBB76E51D0}"/>
+              </a:ext>
+            </a:extLst>
+          </p:cNvPr>
+          <p:cNvSpPr>
+            <a:spLocks noGrp="1"/>
+          </p:cNvSpPr>
+          <p:nvPr>
+            <p:ph type="title"/>
+          </p:nvPr>
+        </p:nvSpPr>
+        <p:spPr/>
+        <p:txBody>
+          <a:bodyPr/>
+          <a:lstStyle/>
+          <a:p>
+            <a:r>
+              <a:rPr lang="en-US" dirty="0"/>
+              <a:t>User Stories</a:t>
+            </a:r>
+          </a:p>
+        </p:txBody>
+      </p:sp>
+      <p:sp>
+        <p:nvSpPr>
+          <p:cNvPr id="3" name="Content Placeholder 2">
+            <a:extLst>
+              <a:ext uri="{FF2B5EF4-FFF2-40B4-BE49-F238E27FC236}">
+                <a16:creationId xmlns:a16="http://schemas.microsoft.com/office/drawing/2014/main" id="{08970AAA-7F1B-4F16-AD62-73990913417C}"/>
+              </a:ext>
+            </a:extLst>
+          </p:cNvPr>
+          <p:cNvSpPr>
+            <a:spLocks noGrp="1"/>
+          </p:cNvSpPr>
+          <p:nvPr>
+            <p:ph idx="1"/>
+          </p:nvPr>
+        </p:nvSpPr>
+        <p:spPr/>
+        <p:txBody>
+          <a:bodyPr/>
+          <a:lstStyle/>
+          <a:p>
+            <a:endParaRPr lang="en-US" dirty="0"/>
+          </a:p>
+        </p:txBody>
+      </p:sp>
+    </p:spTree>
+    <p:extLst>
+      <p:ext uri="{BB962C8B-B14F-4D97-AF65-F5344CB8AC3E}">
+        <p14:creationId xmlns:p14="http://schemas.microsoft.com/office/powerpoint/2010/main" val="4226687088"/>
+      </p:ext>
+    </p:extLst>
+  </p:cSld>
+  <p:clrMapOvr>
+    <a:masterClrMapping/>
+  </p:clrMapOvr>
+</p:sld>
+</file>
+
+<file path=ppt/slides/slide5.xml><?xml version="1.0" encoding="utf-8"?>
+<p:sld xmlns:a="http://schemas.openxmlformats.org/drawingml/2006/main" xmlns:r="http://schemas.openxmlformats.org/officeDocument/2006/relationships" xmlns:p="http://schemas.openxmlformats.org/presentationml/2006/main">
+  <p:cSld>
+    <p:spTree>
+      <p:nvGrpSpPr>
+        <p:cNvPr id="1" name=""/>
+        <p:cNvGrpSpPr/>
+        <p:nvPr/>
+      </p:nvGrpSpPr>
+      <p:grpSpPr>
+        <a:xfrm>
+          <a:off x="0" y="0"/>
+          <a:ext cx="0" cy="0"/>
+          <a:chOff x="0" y="0"/>
+          <a:chExt cx="0" cy="0"/>
+        </a:xfrm>
+      </p:grpSpPr>
+      <p:sp>
+        <p:nvSpPr>
+          <p:cNvPr id="2" name="Title 1">
+            <a:extLst>
+              <a:ext uri="{FF2B5EF4-FFF2-40B4-BE49-F238E27FC236}">
+                <a16:creationId xmlns:a16="http://schemas.microsoft.com/office/drawing/2014/main" id="{781557B2-2FDD-492C-B3A1-89B6EF9BB98C}"/>
+              </a:ext>
+            </a:extLst>
+          </p:cNvPr>
+          <p:cNvSpPr>
+            <a:spLocks noGrp="1"/>
+          </p:cNvSpPr>
+          <p:nvPr>
+            <p:ph type="title"/>
+          </p:nvPr>
+        </p:nvSpPr>
+        <p:spPr/>
+        <p:txBody>
+          <a:bodyPr/>
+          <a:lstStyle/>
+          <a:p>
+            <a:r>
+              <a:rPr lang="en-US" sz="1800" b="1" dirty="0">
+                <a:effectLst/>
+                <a:latin typeface="Cambria" panose="02040503050406030204" pitchFamily="18" charset="0"/>
+                <a:ea typeface="Calibri" panose="020F0502020204030204" pitchFamily="34" charset="0"/>
+                <a:cs typeface="Times New Roman" panose="02020603050405020304" pitchFamily="18" charset="0"/>
+              </a:rPr>
+              <a:t>Proposed Technical Setup</a:t>
+            </a:r>
+            <a:endParaRPr lang="en-US" dirty="0"/>
+          </a:p>
+        </p:txBody>
+      </p:sp>
+      <p:sp>
+        <p:nvSpPr>
+          <p:cNvPr id="3" name="Content Placeholder 2">
+            <a:extLst>
+              <a:ext uri="{FF2B5EF4-FFF2-40B4-BE49-F238E27FC236}">
+                <a16:creationId xmlns:a16="http://schemas.microsoft.com/office/drawing/2014/main" id="{5B311A54-7774-4D5D-A865-D395DE1ACF90}"/>
+              </a:ext>
+            </a:extLst>
+          </p:cNvPr>
+          <p:cNvSpPr>
+            <a:spLocks noGrp="1"/>
+          </p:cNvSpPr>
+          <p:nvPr>
+            <p:ph idx="1"/>
+          </p:nvPr>
+        </p:nvSpPr>
+        <p:spPr/>
+        <p:txBody>
+          <a:bodyPr/>
+          <a:lstStyle/>
+          <a:p>
+            <a:r>
+              <a:rPr lang="en-US" sz="1800" dirty="0">
+                <a:effectLst/>
+                <a:latin typeface="Cambria" panose="02040503050406030204" pitchFamily="18" charset="0"/>
+                <a:ea typeface="Calibri" panose="020F0502020204030204" pitchFamily="34" charset="0"/>
+                <a:cs typeface="Times New Roman" panose="02020603050405020304" pitchFamily="18" charset="0"/>
+              </a:rPr>
+              <a:t>Our team will implement this project in .NET using a MySQL database and WPF.</a:t>
+            </a:r>
+            <a:endParaRPr lang="en-US" sz="1800" dirty="0">
+              <a:effectLst/>
+              <a:latin typeface="Times New Roman" panose="02020603050405020304" pitchFamily="18" charset="0"/>
+              <a:ea typeface="Calibri" panose="020F0502020204030204" pitchFamily="34" charset="0"/>
+              <a:cs typeface="Times New Roman" panose="02020603050405020304" pitchFamily="18" charset="0"/>
+            </a:endParaRPr>
+          </a:p>
+        </p:txBody>
+      </p:sp>
+    </p:spTree>
+    <p:extLst>
+      <p:ext uri="{BB962C8B-B14F-4D97-AF65-F5344CB8AC3E}">
+        <p14:creationId xmlns:p14="http://schemas.microsoft.com/office/powerpoint/2010/main" val="2220903198"/>
+      </p:ext>
+    </p:extLst>
+  </p:cSld>
+  <p:clrMapOvr>
+    <a:masterClrMapping/>
+  </p:clrMapOvr>
+</p:sld>
+</file>
+
+<file path=ppt/slides/slide6.xml><?xml version="1.0" encoding="utf-8"?>
+<p:sld xmlns:a="http://schemas.openxmlformats.org/drawingml/2006/main" xmlns:r="http://schemas.openxmlformats.org/officeDocument/2006/relationships" xmlns:p="http://schemas.openxmlformats.org/presentationml/2006/main">
+  <p:cSld>
+    <p:spTree>
+      <p:nvGrpSpPr>
+        <p:cNvPr id="1" name=""/>
+        <p:cNvGrpSpPr/>
+        <p:nvPr/>
+      </p:nvGrpSpPr>
+      <p:grpSpPr>
+        <a:xfrm>
+          <a:off x="0" y="0"/>
+          <a:ext cx="0" cy="0"/>
+          <a:chOff x="0" y="0"/>
+          <a:chExt cx="0" cy="0"/>
+        </a:xfrm>
+      </p:grpSpPr>
+      <p:sp>
+        <p:nvSpPr>
+          <p:cNvPr id="2" name="Title 1">
+            <a:extLst>
+              <a:ext uri="{FF2B5EF4-FFF2-40B4-BE49-F238E27FC236}">
+                <a16:creationId xmlns:a16="http://schemas.microsoft.com/office/drawing/2014/main" id="{0C7A1735-0AE2-48F6-BBB8-054C1E3726F0}"/>
+              </a:ext>
+            </a:extLst>
+          </p:cNvPr>
+          <p:cNvSpPr>
+            <a:spLocks noGrp="1"/>
+          </p:cNvSpPr>
+          <p:nvPr>
+            <p:ph type="title"/>
+          </p:nvPr>
+        </p:nvSpPr>
+        <p:spPr/>
+        <p:txBody>
+          <a:bodyPr/>
+          <a:lstStyle/>
+          <a:p>
+            <a:r>
+              <a:rPr lang="en-US" dirty="0"/>
+              <a:t>User-Interface</a:t>
+            </a:r>
+          </a:p>
+        </p:txBody>
+      </p:sp>
+      <p:sp>
+        <p:nvSpPr>
+          <p:cNvPr id="3" name="Content Placeholder 2">
+            <a:extLst>
+              <a:ext uri="{FF2B5EF4-FFF2-40B4-BE49-F238E27FC236}">
+                <a16:creationId xmlns:a16="http://schemas.microsoft.com/office/drawing/2014/main" id="{DC75FD96-9EEF-4A2B-87B6-CC4B48F67548}"/>
+              </a:ext>
+            </a:extLst>
+          </p:cNvPr>
+          <p:cNvSpPr>
+            <a:spLocks noGrp="1"/>
+          </p:cNvSpPr>
+          <p:nvPr>
+            <p:ph idx="1"/>
+          </p:nvPr>
+        </p:nvSpPr>
+        <p:spPr/>
+        <p:txBody>
+          <a:bodyPr/>
+          <a:lstStyle/>
+          <a:p>
+            <a:r>
+              <a:rPr lang="en-US" dirty="0"/>
+              <a:t>(Stephen 1-4)</a:t>
+            </a:r>
+          </a:p>
+        </p:txBody>
+      </p:sp>
+    </p:spTree>
+    <p:extLst>
+      <p:ext uri="{BB962C8B-B14F-4D97-AF65-F5344CB8AC3E}">
+        <p14:creationId xmlns:p14="http://schemas.microsoft.com/office/powerpoint/2010/main" val="309347661"/>
+      </p:ext>
+    </p:extLst>
+  </p:cSld>
+  <p:clrMapOvr>
+    <a:masterClrMapping/>
+  </p:clrMapOvr>
+</p:sld>
+</file>
+
+<file path=ppt/slides/slide7.xml><?xml version="1.0" encoding="utf-8"?>
+<p:sld xmlns:a="http://schemas.openxmlformats.org/drawingml/2006/main" xmlns:r="http://schemas.openxmlformats.org/officeDocument/2006/relationships" xmlns:p="http://schemas.openxmlformats.org/presentationml/2006/main">
+  <p:cSld>
+    <p:spTree>
+      <p:nvGrpSpPr>
+        <p:cNvPr id="1" name=""/>
+        <p:cNvGrpSpPr/>
+        <p:nvPr/>
+      </p:nvGrpSpPr>
+      <p:grpSpPr>
+        <a:xfrm>
+          <a:off x="0" y="0"/>
+          <a:ext cx="0" cy="0"/>
+          <a:chOff x="0" y="0"/>
+          <a:chExt cx="0" cy="0"/>
+        </a:xfrm>
+      </p:grpSpPr>
+      <p:sp>
+        <p:nvSpPr>
+          <p:cNvPr id="2" name="Title 1">
+            <a:extLst>
+              <a:ext uri="{FF2B5EF4-FFF2-40B4-BE49-F238E27FC236}">
+                <a16:creationId xmlns:a16="http://schemas.microsoft.com/office/drawing/2014/main" id="{A02A87B9-A947-47EA-AFCC-801325E43868}"/>
+              </a:ext>
+            </a:extLst>
+          </p:cNvPr>
+          <p:cNvSpPr>
+            <a:spLocks noGrp="1"/>
+          </p:cNvSpPr>
+          <p:nvPr>
+            <p:ph type="title"/>
+          </p:nvPr>
+        </p:nvSpPr>
+        <p:spPr/>
+        <p:txBody>
+          <a:bodyPr/>
+          <a:lstStyle/>
+          <a:p>
+            <a:r>
+              <a:rPr lang="en-US" dirty="0"/>
+              <a:t>User-Interface</a:t>
+            </a:r>
+          </a:p>
+        </p:txBody>
+      </p:sp>
+      <p:sp>
+        <p:nvSpPr>
+          <p:cNvPr id="3" name="Content Placeholder 2">
+            <a:extLst>
+              <a:ext uri="{FF2B5EF4-FFF2-40B4-BE49-F238E27FC236}">
+                <a16:creationId xmlns:a16="http://schemas.microsoft.com/office/drawing/2014/main" id="{E36B15B4-F193-46AF-8E0A-4B003EFBC8E3}"/>
+              </a:ext>
+            </a:extLst>
+          </p:cNvPr>
+          <p:cNvSpPr>
+            <a:spLocks noGrp="1"/>
+          </p:cNvSpPr>
+          <p:nvPr>
+            <p:ph idx="1"/>
+          </p:nvPr>
+        </p:nvSpPr>
+        <p:spPr/>
+        <p:txBody>
+          <a:bodyPr/>
+          <a:lstStyle/>
+          <a:p>
+            <a:r>
+              <a:rPr lang="en-US" dirty="0"/>
+              <a:t>(Hailey does the REST)</a:t>
+            </a:r>
+          </a:p>
+        </p:txBody>
+      </p:sp>
+    </p:spTree>
+    <p:extLst>
+      <p:ext uri="{BB962C8B-B14F-4D97-AF65-F5344CB8AC3E}">
+        <p14:creationId xmlns:p14="http://schemas.microsoft.com/office/powerpoint/2010/main" val="271590805"/>
       </p:ext>
     </p:extLst>
   </p:cSld>

</xml_diff>

<commit_message>
Update Group 2 Introductory Presentation.pptx
Added second half of the user interface slides.
</commit_message>
<xml_diff>
--- a/Group 2 Introductory Presentation.pptx
+++ b/Group 2 Introductory Presentation.pptx
@@ -5,10 +5,10 @@
     <p:sldMasterId id="2147483648" r:id="rId4"/>
   </p:sldMasterIdLst>
   <p:notesMasterIdLst>
-    <p:notesMasterId r:id="rId23"/>
+    <p:notesMasterId r:id="rId26"/>
   </p:notesMasterIdLst>
   <p:handoutMasterIdLst>
-    <p:handoutMasterId r:id="rId24"/>
+    <p:handoutMasterId r:id="rId27"/>
   </p:handoutMasterIdLst>
   <p:sldIdLst>
     <p:sldId id="256" r:id="rId5"/>
@@ -27,8 +27,11 @@
     <p:sldId id="284" r:id="rId18"/>
     <p:sldId id="285" r:id="rId19"/>
     <p:sldId id="286" r:id="rId20"/>
-    <p:sldId id="272" r:id="rId21"/>
-    <p:sldId id="273" r:id="rId22"/>
+    <p:sldId id="288" r:id="rId21"/>
+    <p:sldId id="289" r:id="rId22"/>
+    <p:sldId id="273" r:id="rId23"/>
+    <p:sldId id="291" r:id="rId24"/>
+    <p:sldId id="292" r:id="rId25"/>
   </p:sldIdLst>
   <p:sldSz cx="12192000" cy="6858000"/>
   <p:notesSz cx="6858000" cy="9144000"/>
@@ -5726,7 +5729,7 @@
           <p:cNvPr id="2" name="Title 1">
             <a:extLst>
               <a:ext uri="{FF2B5EF4-FFF2-40B4-BE49-F238E27FC236}">
-                <a16:creationId xmlns:a16="http://schemas.microsoft.com/office/drawing/2014/main" id="{0C7A1735-0AE2-48F6-BBB8-054C1E3726F0}"/>
+                <a16:creationId xmlns:a16="http://schemas.microsoft.com/office/drawing/2014/main" id="{6273DCB8-1FDA-4EB5-A9A8-29316F75596E}"/>
               </a:ext>
             </a:extLst>
           </p:cNvPr>
@@ -5737,24 +5740,36 @@
             <p:ph type="title"/>
           </p:nvPr>
         </p:nvSpPr>
-        <p:spPr/>
+        <p:spPr>
+          <a:xfrm>
+            <a:off x="8002587" y="422228"/>
+            <a:ext cx="3122613" cy="1828800"/>
+          </a:xfrm>
+        </p:spPr>
         <p:txBody>
           <a:bodyPr/>
           <a:lstStyle/>
           <a:p>
             <a:r>
               <a:rPr lang="en-US" dirty="0"/>
-              <a:t>User-Interface</a:t>
-            </a:r>
-          </a:p>
-        </p:txBody>
-      </p:sp>
-      <p:sp>
-        <p:nvSpPr>
-          <p:cNvPr id="3" name="Content Placeholder 2">
+              <a:t>User-</a:t>
+            </a:r>
+            <a:br>
+              <a:rPr lang="en-US" dirty="0"/>
+            </a:br>
+            <a:r>
+              <a:rPr lang="en-US" dirty="0"/>
+              <a:t>Interface</a:t>
+            </a:r>
+          </a:p>
+        </p:txBody>
+      </p:sp>
+      <p:sp>
+        <p:nvSpPr>
+          <p:cNvPr id="4" name="Text Placeholder 3">
             <a:extLst>
               <a:ext uri="{FF2B5EF4-FFF2-40B4-BE49-F238E27FC236}">
-                <a16:creationId xmlns:a16="http://schemas.microsoft.com/office/drawing/2014/main" id="{DC75FD96-9EEF-4A2B-87B6-CC4B48F67548}"/>
+                <a16:creationId xmlns:a16="http://schemas.microsoft.com/office/drawing/2014/main" id="{7053B96D-18C4-46F3-A2A0-856622432C86}"/>
               </a:ext>
             </a:extLst>
           </p:cNvPr>
@@ -5762,25 +5777,105 @@
             <a:spLocks noGrp="1"/>
           </p:cNvSpPr>
           <p:nvPr>
-            <p:ph idx="1"/>
-          </p:nvPr>
-        </p:nvSpPr>
-        <p:spPr/>
-        <p:txBody>
-          <a:bodyPr/>
+            <p:ph type="body" sz="half" idx="2"/>
+          </p:nvPr>
+        </p:nvSpPr>
+        <p:spPr>
+          <a:xfrm>
+            <a:off x="8002587" y="2514600"/>
+            <a:ext cx="3124161" cy="3200401"/>
+          </a:xfrm>
+        </p:spPr>
+        <p:txBody>
+          <a:bodyPr>
+            <a:normAutofit/>
+          </a:bodyPr>
           <a:lstStyle/>
           <a:p>
             <a:r>
-              <a:rPr lang="en-US" dirty="0"/>
-              <a:t>(Stephen 1-4)</a:t>
-            </a:r>
-          </a:p>
-        </p:txBody>
-      </p:sp>
+              <a:rPr lang="en-US" sz="1800" b="1" dirty="0"/>
+              <a:t>Window Name: </a:t>
+            </a:r>
+            <a:r>
+              <a:rPr lang="en-US" sz="1800" dirty="0"/>
+              <a:t>Account Settings</a:t>
+            </a:r>
+          </a:p>
+          <a:p>
+            <a:endParaRPr lang="en-US" sz="1800" b="1" dirty="0"/>
+          </a:p>
+          <a:p>
+            <a:r>
+              <a:rPr lang="en-US" sz="1800" b="1" dirty="0"/>
+              <a:t>Description:</a:t>
+            </a:r>
+          </a:p>
+          <a:p>
+            <a:pPr marL="285750" indent="-285750">
+              <a:buFont typeface="Arial" panose="020B0604020202020204" pitchFamily="34" charset="0"/>
+              <a:buChar char="•"/>
+            </a:pPr>
+            <a:r>
+              <a:rPr lang="en-US" sz="1800" dirty="0"/>
+              <a:t>If a user is logged in, they can change their name, username, or password</a:t>
+            </a:r>
+          </a:p>
+          <a:p>
+            <a:pPr marL="285750" indent="-285750">
+              <a:buFont typeface="Arial" panose="020B0604020202020204" pitchFamily="34" charset="0"/>
+              <a:buChar char="•"/>
+            </a:pPr>
+            <a:r>
+              <a:rPr lang="en-US" sz="1800" dirty="0"/>
+              <a:t>Account deletion will trigger a warning window that has the user confirm password one last time</a:t>
+            </a:r>
+          </a:p>
+          <a:p>
+            <a:pPr marL="285750" indent="-285750">
+              <a:buFont typeface="Arial" panose="020B0604020202020204" pitchFamily="34" charset="0"/>
+              <a:buChar char="•"/>
+            </a:pPr>
+            <a:endParaRPr lang="en-US" dirty="0"/>
+          </a:p>
+          <a:p>
+            <a:endParaRPr lang="en-US" dirty="0"/>
+          </a:p>
+        </p:txBody>
+      </p:sp>
+      <p:pic>
+        <p:nvPicPr>
+          <p:cNvPr id="5" name="Picture 4" descr="Diagram&#10;&#10;Description automatically generated">
+            <a:extLst>
+              <a:ext uri="{FF2B5EF4-FFF2-40B4-BE49-F238E27FC236}">
+                <a16:creationId xmlns:a16="http://schemas.microsoft.com/office/drawing/2014/main" id="{BBF5BCE1-0A2D-4446-B074-CADDDA593593}"/>
+              </a:ext>
+            </a:extLst>
+          </p:cNvPr>
+          <p:cNvPicPr>
+            <a:picLocks noChangeAspect="1"/>
+          </p:cNvPicPr>
+          <p:nvPr/>
+        </p:nvPicPr>
+        <p:blipFill>
+          <a:blip r:embed="rId2"/>
+          <a:stretch>
+            <a:fillRect/>
+          </a:stretch>
+        </p:blipFill>
+        <p:spPr>
+          <a:xfrm>
+            <a:off x="2133600" y="422228"/>
+            <a:ext cx="3726498" cy="6013543"/>
+          </a:xfrm>
+          <a:prstGeom prst="rect">
+            <a:avLst/>
+          </a:prstGeom>
+        </p:spPr>
+      </p:pic>
     </p:spTree>
     <p:extLst>
       <p:ext uri="{BB962C8B-B14F-4D97-AF65-F5344CB8AC3E}">
-        <p14:creationId xmlns:p14="http://schemas.microsoft.com/office/powerpoint/2010/main" val="309347661"/>
+        <p14:creationId xmlns:p14="http://schemas.microsoft.com/office/powerpoint/2010/main" val="1509294118"/>
       </p:ext>
     </p:extLst>
   </p:cSld>
@@ -5823,9 +5918,16 @@
             <p:ph type="title"/>
           </p:nvPr>
         </p:nvSpPr>
-        <p:spPr/>
-        <p:txBody>
-          <a:bodyPr/>
+        <p:spPr>
+          <a:xfrm>
+            <a:off x="8019520" y="1143000"/>
+            <a:ext cx="3122613" cy="1828800"/>
+          </a:xfrm>
+        </p:spPr>
+        <p:txBody>
+          <a:bodyPr anchor="b">
+            <a:normAutofit/>
+          </a:bodyPr>
           <a:lstStyle/>
           <a:p>
             <a:r>
@@ -5837,10 +5939,10 @@
       </p:sp>
       <p:sp>
         <p:nvSpPr>
-          <p:cNvPr id="3" name="Content Placeholder 2">
+          <p:cNvPr id="9" name="Text Placeholder 3">
             <a:extLst>
               <a:ext uri="{FF2B5EF4-FFF2-40B4-BE49-F238E27FC236}">
-                <a16:creationId xmlns:a16="http://schemas.microsoft.com/office/drawing/2014/main" id="{E36B15B4-F193-46AF-8E0A-4B003EFBC8E3}"/>
+                <a16:creationId xmlns:a16="http://schemas.microsoft.com/office/drawing/2014/main" id="{5C651B27-40A8-40C5-9397-1732B064497C}"/>
               </a:ext>
             </a:extLst>
           </p:cNvPr>
@@ -5848,18 +5950,297 @@
             <a:spLocks noGrp="1"/>
           </p:cNvSpPr>
           <p:nvPr>
+            <p:ph type="body" sz="half" idx="2"/>
+          </p:nvPr>
+        </p:nvSpPr>
+        <p:spPr>
+          <a:xfrm>
+            <a:off x="8019520" y="3276600"/>
+            <a:ext cx="3124161" cy="3200401"/>
+          </a:xfrm>
+        </p:spPr>
+        <p:txBody>
+          <a:bodyPr>
+            <a:normAutofit/>
+          </a:bodyPr>
+          <a:lstStyle/>
+          <a:p>
+            <a:r>
+              <a:rPr lang="en-US" sz="1800" b="1" dirty="0"/>
+              <a:t>Window Name: </a:t>
+            </a:r>
+            <a:r>
+              <a:rPr lang="en-US" sz="1800" dirty="0"/>
+              <a:t>Upload Scripts</a:t>
+            </a:r>
+          </a:p>
+          <a:p>
+            <a:endParaRPr lang="en-US" sz="1800" b="1" dirty="0"/>
+          </a:p>
+          <a:p>
+            <a:r>
+              <a:rPr lang="en-US" sz="1800" b="1" dirty="0"/>
+              <a:t>Description:</a:t>
+            </a:r>
+          </a:p>
+          <a:p>
+            <a:pPr marL="285750" indent="-285750">
+              <a:buFont typeface="Arial" panose="020B0604020202020204" pitchFamily="34" charset="0"/>
+              <a:buChar char="•"/>
+            </a:pPr>
+            <a:r>
+              <a:rPr lang="en-US" sz="1800" dirty="0"/>
+              <a:t>Upload script file to the community tab</a:t>
+            </a:r>
+          </a:p>
+          <a:p>
+            <a:pPr marL="285750" indent="-285750">
+              <a:buFont typeface="Arial" panose="020B0604020202020204" pitchFamily="34" charset="0"/>
+              <a:buChar char="•"/>
+            </a:pPr>
+            <a:r>
+              <a:rPr lang="en-US" sz="1800" dirty="0"/>
+              <a:t>Assign a title, description, and community tags</a:t>
+            </a:r>
+          </a:p>
+          <a:p>
+            <a:pPr marL="285750" indent="-285750">
+              <a:buFont typeface="Arial" panose="020B0604020202020204" pitchFamily="34" charset="0"/>
+              <a:buChar char="•"/>
+            </a:pPr>
+            <a:r>
+              <a:rPr lang="en-US" sz="1800" dirty="0"/>
+              <a:t>Public or private access to uploads</a:t>
+            </a:r>
+          </a:p>
+          <a:p>
+            <a:pPr marL="285750" indent="-285750">
+              <a:buFont typeface="Arial" panose="020B0604020202020204" pitchFamily="34" charset="0"/>
+              <a:buChar char="•"/>
+            </a:pPr>
+            <a:endParaRPr lang="en-US" dirty="0"/>
+          </a:p>
+        </p:txBody>
+      </p:sp>
+      <p:pic>
+        <p:nvPicPr>
+          <p:cNvPr id="7" name="Picture 6" descr="Diagram, letter&#10;&#10;Description automatically generated">
+            <a:extLst>
+              <a:ext uri="{FF2B5EF4-FFF2-40B4-BE49-F238E27FC236}">
+                <a16:creationId xmlns:a16="http://schemas.microsoft.com/office/drawing/2014/main" id="{6ED35C30-7F9A-4EF2-9495-08132579122D}"/>
+              </a:ext>
+            </a:extLst>
+          </p:cNvPr>
+          <p:cNvPicPr>
+            <a:picLocks noChangeAspect="1"/>
+          </p:cNvPicPr>
+          <p:nvPr/>
+        </p:nvPicPr>
+        <p:blipFill>
+          <a:blip r:embed="rId2"/>
+          <a:stretch>
+            <a:fillRect/>
+          </a:stretch>
+        </p:blipFill>
+        <p:spPr>
+          <a:xfrm>
+            <a:off x="533400" y="944860"/>
+            <a:ext cx="7119938" cy="4968279"/>
+          </a:xfrm>
+          <a:prstGeom prst="rect">
+            <a:avLst/>
+          </a:prstGeom>
+        </p:spPr>
+      </p:pic>
+    </p:spTree>
+    <p:extLst>
+      <p:ext uri="{BB962C8B-B14F-4D97-AF65-F5344CB8AC3E}">
+        <p14:creationId xmlns:p14="http://schemas.microsoft.com/office/powerpoint/2010/main" val="209772754"/>
+      </p:ext>
+    </p:extLst>
+  </p:cSld>
+  <p:clrMapOvr>
+    <a:masterClrMapping/>
+  </p:clrMapOvr>
+</p:sld>
+</file>
+
+<file path=ppt/slides/slide19.xml><?xml version="1.0" encoding="utf-8"?>
+<p:sld xmlns:a="http://schemas.openxmlformats.org/drawingml/2006/main" xmlns:r="http://schemas.openxmlformats.org/officeDocument/2006/relationships" xmlns:p="http://schemas.openxmlformats.org/presentationml/2006/main">
+  <p:cSld>
+    <p:spTree>
+      <p:nvGrpSpPr>
+        <p:cNvPr id="1" name=""/>
+        <p:cNvGrpSpPr/>
+        <p:nvPr/>
+      </p:nvGrpSpPr>
+      <p:grpSpPr>
+        <a:xfrm>
+          <a:off x="0" y="0"/>
+          <a:ext cx="0" cy="0"/>
+          <a:chOff x="0" y="0"/>
+          <a:chExt cx="0" cy="0"/>
+        </a:xfrm>
+      </p:grpSpPr>
+      <p:sp>
+        <p:nvSpPr>
+          <p:cNvPr id="2" name="Title 1">
+            <a:extLst>
+              <a:ext uri="{FF2B5EF4-FFF2-40B4-BE49-F238E27FC236}">
+                <a16:creationId xmlns:a16="http://schemas.microsoft.com/office/drawing/2014/main" id="{A02A87B9-A947-47EA-AFCC-801325E43868}"/>
+              </a:ext>
+            </a:extLst>
+          </p:cNvPr>
+          <p:cNvSpPr>
+            <a:spLocks noGrp="1"/>
+          </p:cNvSpPr>
+          <p:nvPr>
+            <p:ph type="title"/>
+          </p:nvPr>
+        </p:nvSpPr>
+        <p:spPr>
+          <a:xfrm>
+            <a:off x="8019520" y="1066800"/>
+            <a:ext cx="3122613" cy="1828800"/>
+          </a:xfrm>
+        </p:spPr>
+        <p:txBody>
+          <a:bodyPr anchor="b">
+            <a:normAutofit/>
+          </a:bodyPr>
+          <a:lstStyle/>
+          <a:p>
+            <a:r>
+              <a:rPr lang="en-US" dirty="0"/>
+              <a:t>User-Interface</a:t>
+            </a:r>
+          </a:p>
+        </p:txBody>
+      </p:sp>
+      <p:pic>
+        <p:nvPicPr>
+          <p:cNvPr id="4" name="Content Placeholder 3" descr="Diagram&#10;&#10;Description automatically generated">
+            <a:extLst>
+              <a:ext uri="{FF2B5EF4-FFF2-40B4-BE49-F238E27FC236}">
+                <a16:creationId xmlns:a16="http://schemas.microsoft.com/office/drawing/2014/main" id="{70650E1B-39C9-4FDC-BAB7-6707753E7369}"/>
+              </a:ext>
+            </a:extLst>
+          </p:cNvPr>
+          <p:cNvPicPr>
+            <a:picLocks noGrp="1" noChangeAspect="1"/>
+          </p:cNvPicPr>
+          <p:nvPr>
             <p:ph idx="1"/>
           </p:nvPr>
-        </p:nvSpPr>
-        <p:spPr/>
-        <p:txBody>
-          <a:bodyPr/>
+        </p:nvPicPr>
+        <p:blipFill>
+          <a:blip r:embed="rId2" cstate="print">
+            <a:extLst>
+              <a:ext uri="{28A0092B-C50C-407E-A947-70E740481C1C}">
+                <a14:useLocalDpi xmlns:a14="http://schemas.microsoft.com/office/drawing/2010/main" val="0"/>
+              </a:ext>
+            </a:extLst>
+          </a:blip>
+          <a:stretch>
+            <a:fillRect/>
+          </a:stretch>
+        </p:blipFill>
+        <p:spPr bwMode="auto">
+          <a:xfrm>
+            <a:off x="760411" y="1484758"/>
+            <a:ext cx="6837933" cy="4154042"/>
+          </a:xfrm>
+          <a:prstGeom prst="rect">
+            <a:avLst/>
+          </a:prstGeom>
+          <a:noFill/>
+          <a:ln>
+            <a:noFill/>
+          </a:ln>
+        </p:spPr>
+      </p:pic>
+      <p:sp>
+        <p:nvSpPr>
+          <p:cNvPr id="9" name="Text Placeholder 3">
+            <a:extLst>
+              <a:ext uri="{FF2B5EF4-FFF2-40B4-BE49-F238E27FC236}">
+                <a16:creationId xmlns:a16="http://schemas.microsoft.com/office/drawing/2014/main" id="{5C651B27-40A8-40C5-9397-1732B064497C}"/>
+              </a:ext>
+            </a:extLst>
+          </p:cNvPr>
+          <p:cNvSpPr>
+            <a:spLocks noGrp="1"/>
+          </p:cNvSpPr>
+          <p:nvPr>
+            <p:ph type="body" sz="half" idx="2"/>
+          </p:nvPr>
+        </p:nvSpPr>
+        <p:spPr>
+          <a:xfrm>
+            <a:off x="8036453" y="2971800"/>
+            <a:ext cx="3124161" cy="2819400"/>
+          </a:xfrm>
+        </p:spPr>
+        <p:txBody>
+          <a:bodyPr>
+            <a:normAutofit/>
+          </a:bodyPr>
           <a:lstStyle/>
           <a:p>
             <a:r>
-              <a:rPr lang="en-US" dirty="0"/>
-              <a:t>(Hailey does the REST)</a:t>
-            </a:r>
+              <a:rPr lang="en-US" sz="1900" b="1" dirty="0"/>
+              <a:t>Window Name: </a:t>
+            </a:r>
+            <a:r>
+              <a:rPr lang="en-US" sz="1900" dirty="0"/>
+              <a:t>Community Scripts Menu</a:t>
+            </a:r>
+          </a:p>
+          <a:p>
+            <a:endParaRPr lang="en-US" sz="1900" b="1" dirty="0"/>
+          </a:p>
+          <a:p>
+            <a:r>
+              <a:rPr lang="en-US" sz="1900" b="1" dirty="0"/>
+              <a:t>Description:</a:t>
+            </a:r>
+          </a:p>
+          <a:p>
+            <a:pPr marL="285750" indent="-285750">
+              <a:buFont typeface="Arial" panose="020B0604020202020204" pitchFamily="34" charset="0"/>
+              <a:buChar char="•"/>
+            </a:pPr>
+            <a:r>
+              <a:rPr lang="en-US" sz="1900" dirty="0"/>
+              <a:t>Browse public scripts from other users</a:t>
+            </a:r>
+          </a:p>
+          <a:p>
+            <a:pPr marL="285750" indent="-285750">
+              <a:buFont typeface="Arial" panose="020B0604020202020204" pitchFamily="34" charset="0"/>
+              <a:buChar char="•"/>
+            </a:pPr>
+            <a:r>
+              <a:rPr lang="en-US" sz="1900" dirty="0"/>
+              <a:t>Search by title or sort by tags</a:t>
+            </a:r>
+          </a:p>
+          <a:p>
+            <a:pPr marL="285750" indent="-285750">
+              <a:buFont typeface="Arial" panose="020B0604020202020204" pitchFamily="34" charset="0"/>
+              <a:buChar char="•"/>
+            </a:pPr>
+            <a:r>
+              <a:rPr lang="en-US" sz="1900" dirty="0"/>
+              <a:t>Download and use script in a new or existing file</a:t>
+            </a:r>
+          </a:p>
+          <a:p>
+            <a:pPr marL="285750" indent="-285750">
+              <a:buFont typeface="Arial" panose="020B0604020202020204" pitchFamily="34" charset="0"/>
+              <a:buChar char="•"/>
+            </a:pPr>
+            <a:endParaRPr lang="en-US" dirty="0"/>
           </a:p>
         </p:txBody>
       </p:sp>
@@ -6023,6 +6404,193 @@
     <p:extLst>
       <p:ext uri="{BB962C8B-B14F-4D97-AF65-F5344CB8AC3E}">
         <p14:creationId xmlns:p14="http://schemas.microsoft.com/office/powerpoint/2010/main" val="3042826300"/>
+      </p:ext>
+    </p:extLst>
+  </p:cSld>
+  <p:clrMapOvr>
+    <a:masterClrMapping/>
+  </p:clrMapOvr>
+</p:sld>
+</file>
+
+<file path=ppt/slides/slide20.xml><?xml version="1.0" encoding="utf-8"?>
+<p:sld xmlns:a="http://schemas.openxmlformats.org/drawingml/2006/main" xmlns:r="http://schemas.openxmlformats.org/officeDocument/2006/relationships" xmlns:p="http://schemas.openxmlformats.org/presentationml/2006/main">
+  <p:cSld>
+    <p:spTree>
+      <p:nvGrpSpPr>
+        <p:cNvPr id="1" name=""/>
+        <p:cNvGrpSpPr/>
+        <p:nvPr/>
+      </p:nvGrpSpPr>
+      <p:grpSpPr>
+        <a:xfrm>
+          <a:off x="0" y="0"/>
+          <a:ext cx="0" cy="0"/>
+          <a:chOff x="0" y="0"/>
+          <a:chExt cx="0" cy="0"/>
+        </a:xfrm>
+      </p:grpSpPr>
+      <p:sp>
+        <p:nvSpPr>
+          <p:cNvPr id="10" name="Title 1">
+            <a:extLst>
+              <a:ext uri="{FF2B5EF4-FFF2-40B4-BE49-F238E27FC236}">
+                <a16:creationId xmlns:a16="http://schemas.microsoft.com/office/drawing/2014/main" id="{8D2A4761-4C37-4449-94B9-6D423FE482C5}"/>
+              </a:ext>
+            </a:extLst>
+          </p:cNvPr>
+          <p:cNvSpPr>
+            <a:spLocks noGrp="1"/>
+          </p:cNvSpPr>
+          <p:nvPr>
+            <p:ph type="title"/>
+          </p:nvPr>
+        </p:nvSpPr>
+        <p:spPr>
+          <a:xfrm>
+            <a:off x="1524000" y="0"/>
+            <a:ext cx="9144000" cy="1143000"/>
+          </a:xfrm>
+        </p:spPr>
+        <p:txBody>
+          <a:bodyPr/>
+          <a:lstStyle/>
+          <a:p>
+            <a:r>
+              <a:rPr lang="en-US" dirty="0"/>
+              <a:t>Window Sequence</a:t>
+            </a:r>
+          </a:p>
+        </p:txBody>
+      </p:sp>
+      <p:pic>
+        <p:nvPicPr>
+          <p:cNvPr id="5" name="Picture 4" descr="Diagram&#10;&#10;Description automatically generated">
+            <a:extLst>
+              <a:ext uri="{FF2B5EF4-FFF2-40B4-BE49-F238E27FC236}">
+                <a16:creationId xmlns:a16="http://schemas.microsoft.com/office/drawing/2014/main" id="{37E585B0-4DF1-4FDC-9CE1-9A1CD5956097}"/>
+              </a:ext>
+            </a:extLst>
+          </p:cNvPr>
+          <p:cNvPicPr>
+            <a:picLocks noChangeAspect="1"/>
+          </p:cNvPicPr>
+          <p:nvPr/>
+        </p:nvPicPr>
+        <p:blipFill>
+          <a:blip r:embed="rId2"/>
+          <a:stretch>
+            <a:fillRect/>
+          </a:stretch>
+        </p:blipFill>
+        <p:spPr>
+          <a:xfrm>
+            <a:off x="1212631" y="1447800"/>
+            <a:ext cx="9766738" cy="4956620"/>
+          </a:xfrm>
+          <a:prstGeom prst="rect">
+            <a:avLst/>
+          </a:prstGeom>
+          <a:noFill/>
+        </p:spPr>
+      </p:pic>
+    </p:spTree>
+    <p:extLst>
+      <p:ext uri="{BB962C8B-B14F-4D97-AF65-F5344CB8AC3E}">
+        <p14:creationId xmlns:p14="http://schemas.microsoft.com/office/powerpoint/2010/main" val="782956656"/>
+      </p:ext>
+    </p:extLst>
+  </p:cSld>
+  <p:clrMapOvr>
+    <a:masterClrMapping/>
+  </p:clrMapOvr>
+</p:sld>
+</file>
+
+<file path=ppt/slides/slide21.xml><?xml version="1.0" encoding="utf-8"?>
+<p:sld xmlns:a="http://schemas.openxmlformats.org/drawingml/2006/main" xmlns:r="http://schemas.openxmlformats.org/officeDocument/2006/relationships" xmlns:p="http://schemas.openxmlformats.org/presentationml/2006/main">
+  <p:cSld>
+    <p:spTree>
+      <p:nvGrpSpPr>
+        <p:cNvPr id="1" name=""/>
+        <p:cNvGrpSpPr/>
+        <p:nvPr/>
+      </p:nvGrpSpPr>
+      <p:grpSpPr>
+        <a:xfrm>
+          <a:off x="0" y="0"/>
+          <a:ext cx="0" cy="0"/>
+          <a:chOff x="0" y="0"/>
+          <a:chExt cx="0" cy="0"/>
+        </a:xfrm>
+      </p:grpSpPr>
+      <p:sp>
+        <p:nvSpPr>
+          <p:cNvPr id="10" name="Title 1">
+            <a:extLst>
+              <a:ext uri="{FF2B5EF4-FFF2-40B4-BE49-F238E27FC236}">
+                <a16:creationId xmlns:a16="http://schemas.microsoft.com/office/drawing/2014/main" id="{8D2A4761-4C37-4449-94B9-6D423FE482C5}"/>
+              </a:ext>
+            </a:extLst>
+          </p:cNvPr>
+          <p:cNvSpPr>
+            <a:spLocks noGrp="1"/>
+          </p:cNvSpPr>
+          <p:nvPr>
+            <p:ph type="title"/>
+          </p:nvPr>
+        </p:nvSpPr>
+        <p:spPr>
+          <a:xfrm>
+            <a:off x="1524000" y="0"/>
+            <a:ext cx="9144000" cy="1143000"/>
+          </a:xfrm>
+        </p:spPr>
+        <p:txBody>
+          <a:bodyPr/>
+          <a:lstStyle/>
+          <a:p>
+            <a:r>
+              <a:rPr lang="en-US" dirty="0"/>
+              <a:t>Window Sequence</a:t>
+            </a:r>
+          </a:p>
+        </p:txBody>
+      </p:sp>
+      <p:pic>
+        <p:nvPicPr>
+          <p:cNvPr id="4" name="Picture 3" descr="Diagram&#10;&#10;Description automatically generated">
+            <a:extLst>
+              <a:ext uri="{FF2B5EF4-FFF2-40B4-BE49-F238E27FC236}">
+                <a16:creationId xmlns:a16="http://schemas.microsoft.com/office/drawing/2014/main" id="{896D1089-1689-4BD7-B0FC-C5C4094E5E88}"/>
+              </a:ext>
+            </a:extLst>
+          </p:cNvPr>
+          <p:cNvPicPr>
+            <a:picLocks noChangeAspect="1"/>
+          </p:cNvPicPr>
+          <p:nvPr/>
+        </p:nvPicPr>
+        <p:blipFill>
+          <a:blip r:embed="rId2"/>
+          <a:stretch>
+            <a:fillRect/>
+          </a:stretch>
+        </p:blipFill>
+        <p:spPr>
+          <a:xfrm>
+            <a:off x="1682594" y="1219200"/>
+            <a:ext cx="8826812" cy="5472113"/>
+          </a:xfrm>
+          <a:prstGeom prst="rect">
+            <a:avLst/>
+          </a:prstGeom>
+        </p:spPr>
+      </p:pic>
+    </p:spTree>
+    <p:extLst>
+      <p:ext uri="{BB962C8B-B14F-4D97-AF65-F5344CB8AC3E}">
+        <p14:creationId xmlns:p14="http://schemas.microsoft.com/office/powerpoint/2010/main" val="1513829378"/>
       </p:ext>
     </p:extLst>
   </p:cSld>
@@ -8794,18 +9362,18 @@
 </file>
 
 <file path=customXml/item1.xml><?xml version="1.0" encoding="utf-8"?>
-<p:properties xmlns:p="http://schemas.microsoft.com/office/2006/metadata/properties" xmlns:xsi="http://www.w3.org/2001/XMLSchema-instance" xmlns:pc="http://schemas.microsoft.com/office/infopath/2007/PartnerControls">
-  <documentManagement/>
-</p:properties>
-</file>
-
-<file path=customXml/item2.xml><?xml version="1.0" encoding="utf-8"?>
 <?mso-contentType ?>
 <FormTemplates xmlns="http://schemas.microsoft.com/sharepoint/v3/contenttype/forms">
   <Display>DocumentLibraryForm</Display>
   <Edit>DocumentLibraryForm</Edit>
   <New>DocumentLibraryForm</New>
 </FormTemplates>
+</file>
+
+<file path=customXml/item2.xml><?xml version="1.0" encoding="utf-8"?>
+<p:properties xmlns:p="http://schemas.microsoft.com/office/2006/metadata/properties" xmlns:xsi="http://www.w3.org/2001/XMLSchema-instance" xmlns:pc="http://schemas.microsoft.com/office/infopath/2007/PartnerControls">
+  <documentManagement/>
+</p:properties>
 </file>
 
 <file path=customXml/item3.xml><?xml version="1.0" encoding="utf-8"?>
@@ -8980,6 +9548,14 @@
 </file>
 
 <file path=customXml/itemProps1.xml><?xml version="1.0" encoding="utf-8"?>
+<ds:datastoreItem xmlns:ds="http://schemas.openxmlformats.org/officeDocument/2006/customXml" ds:itemID="{04A9154E-231E-4CB2-AC8C-7B014F34E538}">
+  <ds:schemaRefs>
+    <ds:schemaRef ds:uri="http://schemas.microsoft.com/sharepoint/v3/contenttype/forms"/>
+  </ds:schemaRefs>
+</ds:datastoreItem>
+</file>
+
+<file path=customXml/itemProps2.xml><?xml version="1.0" encoding="utf-8"?>
 <ds:datastoreItem xmlns:ds="http://schemas.openxmlformats.org/officeDocument/2006/customXml" ds:itemID="{C7E67B52-EB16-45E9-85E8-F97407C0431C}">
   <ds:schemaRefs>
     <ds:schemaRef ds:uri="http://purl.org/dc/terms/"/>
@@ -8992,14 +9568,6 @@
     <ds:schemaRef ds:uri="http://schemas.microsoft.com/office/2006/metadata/properties"/>
     <ds:schemaRef ds:uri="7b8c18a8-6b9c-407a-aab5-933237a193b4"/>
     <ds:schemaRef ds:uri="http://www.w3.org/XML/1998/namespace"/>
-  </ds:schemaRefs>
-</ds:datastoreItem>
-</file>
-
-<file path=customXml/itemProps2.xml><?xml version="1.0" encoding="utf-8"?>
-<ds:datastoreItem xmlns:ds="http://schemas.openxmlformats.org/officeDocument/2006/customXml" ds:itemID="{04A9154E-231E-4CB2-AC8C-7B014F34E538}">
-  <ds:schemaRefs>
-    <ds:schemaRef ds:uri="http://schemas.microsoft.com/sharepoint/v3/contenttype/forms"/>
   </ds:schemaRefs>
 </ds:datastoreItem>
 </file>

</xml_diff>

<commit_message>
Minor Adjustments to Introduction
</commit_message>
<xml_diff>
--- a/Group 2 Introductory Presentation.pptx
+++ b/Group 2 Introductory Presentation.pptx
@@ -6651,6 +6651,43 @@
             </a:r>
           </a:p>
           <a:p>
+            <a:pPr lvl="1"/>
+            <a:r>
+              <a:rPr lang="en-US" dirty="0">
+                <a:latin typeface="Cambria" panose="02040503050406030204" pitchFamily="18" charset="0"/>
+                <a:ea typeface="Calibri" panose="020F0502020204030204" pitchFamily="34" charset="0"/>
+                <a:cs typeface="Times New Roman" panose="02020603050405020304" pitchFamily="18" charset="0"/>
+              </a:rPr>
+              <a:t>t</a:t>
+            </a:r>
+            <a:r>
+              <a:rPr lang="en-US" dirty="0">
+                <a:effectLst/>
+                <a:latin typeface="Cambria" panose="02040503050406030204" pitchFamily="18" charset="0"/>
+                <a:ea typeface="Calibri" panose="020F0502020204030204" pitchFamily="34" charset="0"/>
+                <a:cs typeface="Times New Roman" panose="02020603050405020304" pitchFamily="18" charset="0"/>
+              </a:rPr>
+              <a:t>arget audience</a:t>
+            </a:r>
+            <a:r>
+              <a:rPr lang="en-US" dirty="0">
+                <a:latin typeface="Cambria" panose="02040503050406030204" pitchFamily="18" charset="0"/>
+                <a:ea typeface="Calibri" panose="020F0502020204030204" pitchFamily="34" charset="0"/>
+                <a:cs typeface="Times New Roman" panose="02020603050405020304" pitchFamily="18" charset="0"/>
+              </a:rPr>
+              <a:t>: </a:t>
+            </a:r>
+            <a:r>
+              <a:rPr lang="en-US" dirty="0">
+                <a:effectLst/>
+                <a:latin typeface="Cambria" panose="02040503050406030204" pitchFamily="18" charset="0"/>
+                <a:ea typeface="Calibri" panose="020F0502020204030204" pitchFamily="34" charset="0"/>
+                <a:cs typeface="Times New Roman" panose="02020603050405020304" pitchFamily="18" charset="0"/>
+              </a:rPr>
+              <a:t>less-experienced computer-users </a:t>
+            </a:r>
+          </a:p>
+          <a:p>
             <a:r>
               <a:rPr lang="en-US" b="1" dirty="0">
                 <a:effectLst/>
@@ -6666,8 +6703,13 @@
                 <a:ea typeface="Calibri" panose="020F0502020204030204" pitchFamily="34" charset="0"/>
                 <a:cs typeface="Times New Roman" panose="02020603050405020304" pitchFamily="18" charset="0"/>
               </a:rPr>
-              <a:t>Make it easier to script</a:t>
-            </a:r>
+              <a:t>Make it easier to script </a:t>
+            </a:r>
+            <a:endParaRPr lang="en-US" dirty="0">
+              <a:latin typeface="Harlow Solid Italic" panose="04030604020F02020D02" pitchFamily="82" charset="0"/>
+            </a:endParaRPr>
+          </a:p>
+          <a:p>
             <a:endParaRPr lang="en-US" dirty="0">
               <a:latin typeface="Harlow Solid Italic" panose="04030604020F02020D02" pitchFamily="82" charset="0"/>
             </a:endParaRPr>
@@ -7165,46 +7207,15 @@
               </a:rPr>
               <a:t> scripting simple</a:t>
             </a:r>
-            <a:endParaRPr lang="en-US" dirty="0">
-              <a:latin typeface="Cambria" panose="02040503050406030204" pitchFamily="18" charset="0"/>
-              <a:ea typeface="Calibri" panose="020F0502020204030204" pitchFamily="34" charset="0"/>
-              <a:cs typeface="Times New Roman" panose="02020603050405020304" pitchFamily="18" charset="0"/>
-            </a:endParaRPr>
-          </a:p>
-          <a:p>
-            <a:r>
-              <a:rPr lang="en-US" b="1" dirty="0">
-                <a:latin typeface="Cambria" panose="02040503050406030204" pitchFamily="18" charset="0"/>
-                <a:ea typeface="Calibri" panose="020F0502020204030204" pitchFamily="34" charset="0"/>
-                <a:cs typeface="Times New Roman" panose="02020603050405020304" pitchFamily="18" charset="0"/>
-              </a:rPr>
-              <a:t>T</a:t>
-            </a:r>
-            <a:r>
-              <a:rPr lang="en-US" b="1" dirty="0">
-                <a:effectLst/>
-                <a:latin typeface="Cambria" panose="02040503050406030204" pitchFamily="18" charset="0"/>
-                <a:ea typeface="Calibri" panose="020F0502020204030204" pitchFamily="34" charset="0"/>
-                <a:cs typeface="Times New Roman" panose="02020603050405020304" pitchFamily="18" charset="0"/>
-              </a:rPr>
-              <a:t>arget audience</a:t>
-            </a:r>
-            <a:r>
-              <a:rPr lang="en-US" b="1" dirty="0">
-                <a:latin typeface="Cambria" panose="02040503050406030204" pitchFamily="18" charset="0"/>
-                <a:ea typeface="Calibri" panose="020F0502020204030204" pitchFamily="34" charset="0"/>
-                <a:cs typeface="Times New Roman" panose="02020603050405020304" pitchFamily="18" charset="0"/>
-              </a:rPr>
-              <a:t>: </a:t>
-            </a:r>
+          </a:p>
+          <a:p>
+            <a:pPr lvl="1"/>
             <a:r>
               <a:rPr lang="en-US" dirty="0">
-                <a:effectLst/>
-                <a:latin typeface="Cambria" panose="02040503050406030204" pitchFamily="18" charset="0"/>
-                <a:ea typeface="Calibri" panose="020F0502020204030204" pitchFamily="34" charset="0"/>
-                <a:cs typeface="Times New Roman" panose="02020603050405020304" pitchFamily="18" charset="0"/>
-              </a:rPr>
-              <a:t>less-experienced computer-users </a:t>
+                <a:latin typeface="Cambria" panose="02040503050406030204" pitchFamily="18" charset="0"/>
+                <a:cs typeface="Times New Roman" panose="02020603050405020304" pitchFamily="18" charset="0"/>
+              </a:rPr>
+              <a:t>No code - no problem</a:t>
             </a:r>
             <a:endParaRPr lang="en-US" dirty="0">
               <a:latin typeface="Harlow Solid Italic" panose="04030604020F02020D02" pitchFamily="82" charset="0"/>
@@ -9846,18 +9857,18 @@
 </file>
 
 <file path=customXml/item1.xml><?xml version="1.0" encoding="utf-8"?>
+<p:properties xmlns:p="http://schemas.microsoft.com/office/2006/metadata/properties" xmlns:xsi="http://www.w3.org/2001/XMLSchema-instance" xmlns:pc="http://schemas.microsoft.com/office/infopath/2007/PartnerControls">
+  <documentManagement/>
+</p:properties>
+</file>
+
+<file path=customXml/item2.xml><?xml version="1.0" encoding="utf-8"?>
 <?mso-contentType ?>
 <FormTemplates xmlns="http://schemas.microsoft.com/sharepoint/v3/contenttype/forms">
   <Display>DocumentLibraryForm</Display>
   <Edit>DocumentLibraryForm</Edit>
   <New>DocumentLibraryForm</New>
 </FormTemplates>
-</file>
-
-<file path=customXml/item2.xml><?xml version="1.0" encoding="utf-8"?>
-<p:properties xmlns:p="http://schemas.microsoft.com/office/2006/metadata/properties" xmlns:xsi="http://www.w3.org/2001/XMLSchema-instance" xmlns:pc="http://schemas.microsoft.com/office/infopath/2007/PartnerControls">
-  <documentManagement/>
-</p:properties>
 </file>
 
 <file path=customXml/item3.xml><?xml version="1.0" encoding="utf-8"?>
@@ -10032,14 +10043,6 @@
 </file>
 
 <file path=customXml/itemProps1.xml><?xml version="1.0" encoding="utf-8"?>
-<ds:datastoreItem xmlns:ds="http://schemas.openxmlformats.org/officeDocument/2006/customXml" ds:itemID="{04A9154E-231E-4CB2-AC8C-7B014F34E538}">
-  <ds:schemaRefs>
-    <ds:schemaRef ds:uri="http://schemas.microsoft.com/sharepoint/v3/contenttype/forms"/>
-  </ds:schemaRefs>
-</ds:datastoreItem>
-</file>
-
-<file path=customXml/itemProps2.xml><?xml version="1.0" encoding="utf-8"?>
 <ds:datastoreItem xmlns:ds="http://schemas.openxmlformats.org/officeDocument/2006/customXml" ds:itemID="{C7E67B52-EB16-45E9-85E8-F97407C0431C}">
   <ds:schemaRefs>
     <ds:schemaRef ds:uri="http://purl.org/dc/terms/"/>
@@ -10052,6 +10055,14 @@
     <ds:schemaRef ds:uri="http://schemas.microsoft.com/office/2006/metadata/properties"/>
     <ds:schemaRef ds:uri="7b8c18a8-6b9c-407a-aab5-933237a193b4"/>
     <ds:schemaRef ds:uri="http://www.w3.org/XML/1998/namespace"/>
+  </ds:schemaRefs>
+</ds:datastoreItem>
+</file>
+
+<file path=customXml/itemProps2.xml><?xml version="1.0" encoding="utf-8"?>
+<ds:datastoreItem xmlns:ds="http://schemas.openxmlformats.org/officeDocument/2006/customXml" ds:itemID="{04A9154E-231E-4CB2-AC8C-7B014F34E538}">
+  <ds:schemaRefs>
+    <ds:schemaRef ds:uri="http://schemas.microsoft.com/sharepoint/v3/contenttype/forms"/>
   </ds:schemaRefs>
 </ds:datastoreItem>
 </file>

</xml_diff>

<commit_message>
Change font size on user stories
</commit_message>
<xml_diff>
--- a/Group 2 Introductory Presentation.pptx
+++ b/Group 2 Introductory Presentation.pptx
@@ -4127,7 +4127,9 @@
         </p:nvSpPr>
         <p:spPr/>
         <p:txBody>
-          <a:bodyPr/>
+          <a:bodyPr>
+            <a:normAutofit/>
+          </a:bodyPr>
           <a:lstStyle/>
           <a:p>
             <a:pPr>
@@ -4136,7 +4138,7 @@
               </a:spcBef>
             </a:pPr>
             <a:r>
-              <a:rPr lang="en-US" sz="1800" b="1" dirty="0">
+              <a:rPr lang="en-US" b="1" dirty="0">
                 <a:effectLst/>
                 <a:latin typeface="Cambria" panose="02040503050406030204" pitchFamily="18" charset="0"/>
                 <a:ea typeface="Calibri" panose="020F0502020204030204" pitchFamily="34" charset="0"/>
@@ -4145,7 +4147,7 @@
               <a:t>As a</a:t>
             </a:r>
             <a:r>
-              <a:rPr lang="en-US" sz="1800" dirty="0">
+              <a:rPr lang="en-US" dirty="0">
                 <a:effectLst/>
                 <a:latin typeface="Cambria" panose="02040503050406030204" pitchFamily="18" charset="0"/>
                 <a:ea typeface="Calibri" panose="020F0502020204030204" pitchFamily="34" charset="0"/>
@@ -4154,7 +4156,7 @@
               <a:t> programmer, </a:t>
             </a:r>
             <a:br>
-              <a:rPr lang="en-US" sz="1800" dirty="0">
+              <a:rPr lang="en-US" dirty="0">
                 <a:effectLst/>
                 <a:latin typeface="Cambria" panose="02040503050406030204" pitchFamily="18" charset="0"/>
                 <a:ea typeface="Calibri" panose="020F0502020204030204" pitchFamily="34" charset="0"/>
@@ -4162,7 +4164,7 @@
               </a:rPr>
             </a:br>
             <a:r>
-              <a:rPr lang="en-US" sz="1800" b="1" dirty="0">
+              <a:rPr lang="en-US" b="1" dirty="0">
                 <a:effectLst/>
                 <a:latin typeface="Cambria" panose="02040503050406030204" pitchFamily="18" charset="0"/>
                 <a:ea typeface="Calibri" panose="020F0502020204030204" pitchFamily="34" charset="0"/>
@@ -4171,7 +4173,7 @@
               <a:t>so that</a:t>
             </a:r>
             <a:r>
-              <a:rPr lang="en-US" sz="1800" dirty="0">
+              <a:rPr lang="en-US" dirty="0">
                 <a:effectLst/>
                 <a:latin typeface="Cambria" panose="02040503050406030204" pitchFamily="18" charset="0"/>
                 <a:ea typeface="Calibri" panose="020F0502020204030204" pitchFamily="34" charset="0"/>
@@ -4180,7 +4182,7 @@
               <a:t> I can keep my workstation secure, </a:t>
             </a:r>
             <a:br>
-              <a:rPr lang="en-US" sz="1800" dirty="0">
+              <a:rPr lang="en-US" dirty="0">
                 <a:effectLst/>
                 <a:latin typeface="Cambria" panose="02040503050406030204" pitchFamily="18" charset="0"/>
                 <a:ea typeface="Calibri" panose="020F0502020204030204" pitchFamily="34" charset="0"/>
@@ -4188,7 +4190,7 @@
               </a:rPr>
             </a:br>
             <a:r>
-              <a:rPr lang="en-US" sz="1800" b="1" dirty="0">
+              <a:rPr lang="en-US" b="1" dirty="0">
                 <a:effectLst/>
                 <a:latin typeface="Cambria" panose="02040503050406030204" pitchFamily="18" charset="0"/>
                 <a:ea typeface="Calibri" panose="020F0502020204030204" pitchFamily="34" charset="0"/>
@@ -4197,7 +4199,7 @@
               <a:t>I want to</a:t>
             </a:r>
             <a:r>
-              <a:rPr lang="en-US" sz="1800" dirty="0">
+              <a:rPr lang="en-US" dirty="0">
                 <a:effectLst/>
                 <a:latin typeface="Cambria" panose="02040503050406030204" pitchFamily="18" charset="0"/>
                 <a:ea typeface="Calibri" panose="020F0502020204030204" pitchFamily="34" charset="0"/>
@@ -4205,7 +4207,7 @@
               </a:rPr>
               <a:t> be able to logout of my account.  </a:t>
             </a:r>
-            <a:endParaRPr lang="en-US" sz="1800" dirty="0">
+            <a:endParaRPr lang="en-US" dirty="0">
               <a:effectLst/>
               <a:latin typeface="Times New Roman" panose="02020603050405020304" pitchFamily="18" charset="0"/>
               <a:ea typeface="Calibri" panose="020F0502020204030204" pitchFamily="34" charset="0"/>
@@ -4219,7 +4221,7 @@
               </a:spcBef>
             </a:pPr>
             <a:r>
-              <a:rPr lang="en-US" sz="1600" dirty="0">
+              <a:rPr lang="en-US" dirty="0">
                 <a:effectLst/>
                 <a:latin typeface="Cambria" panose="02040503050406030204" pitchFamily="18" charset="0"/>
                 <a:ea typeface="Calibri" panose="020F0502020204030204" pitchFamily="34" charset="0"/>
@@ -4227,7 +4229,7 @@
               </a:rPr>
               <a:t>Story Point(s): 1</a:t>
             </a:r>
-            <a:endParaRPr lang="en-US" sz="1600" dirty="0">
+            <a:endParaRPr lang="en-US" dirty="0">
               <a:effectLst/>
               <a:latin typeface="Times New Roman" panose="02020603050405020304" pitchFamily="18" charset="0"/>
               <a:ea typeface="Calibri" panose="020F0502020204030204" pitchFamily="34" charset="0"/>
@@ -4244,7 +4246,7 @@
               </a:spcAft>
               <a:buNone/>
             </a:pPr>
-            <a:endParaRPr lang="en-US" sz="1800" dirty="0">
+            <a:endParaRPr lang="en-US" dirty="0">
               <a:effectLst/>
               <a:latin typeface="Times New Roman" panose="02020603050405020304" pitchFamily="18" charset="0"/>
               <a:ea typeface="Calibri" panose="020F0502020204030204" pitchFamily="34" charset="0"/>
@@ -4258,7 +4260,7 @@
               </a:spcBef>
             </a:pPr>
             <a:r>
-              <a:rPr lang="en-US" sz="1800" b="1" dirty="0">
+              <a:rPr lang="en-US" b="1" dirty="0">
                 <a:effectLst/>
                 <a:latin typeface="Cambria" panose="02040503050406030204" pitchFamily="18" charset="0"/>
                 <a:ea typeface="Calibri" panose="020F0502020204030204" pitchFamily="34" charset="0"/>
@@ -4267,7 +4269,7 @@
               <a:t>As a</a:t>
             </a:r>
             <a:r>
-              <a:rPr lang="en-US" sz="1800" dirty="0">
+              <a:rPr lang="en-US" dirty="0">
                 <a:effectLst/>
                 <a:latin typeface="Cambria" panose="02040503050406030204" pitchFamily="18" charset="0"/>
                 <a:ea typeface="Calibri" panose="020F0502020204030204" pitchFamily="34" charset="0"/>
@@ -4276,7 +4278,7 @@
               <a:t> programmer, </a:t>
             </a:r>
             <a:br>
-              <a:rPr lang="en-US" sz="1800" dirty="0">
+              <a:rPr lang="en-US" dirty="0">
                 <a:effectLst/>
                 <a:latin typeface="Cambria" panose="02040503050406030204" pitchFamily="18" charset="0"/>
                 <a:ea typeface="Calibri" panose="020F0502020204030204" pitchFamily="34" charset="0"/>
@@ -4284,7 +4286,7 @@
               </a:rPr>
             </a:br>
             <a:r>
-              <a:rPr lang="en-US" sz="1800" b="1" dirty="0">
+              <a:rPr lang="en-US" b="1" dirty="0">
                 <a:effectLst/>
                 <a:latin typeface="Cambria" panose="02040503050406030204" pitchFamily="18" charset="0"/>
                 <a:ea typeface="Calibri" panose="020F0502020204030204" pitchFamily="34" charset="0"/>
@@ -4293,7 +4295,7 @@
               <a:t>so that</a:t>
             </a:r>
             <a:r>
-              <a:rPr lang="en-US" sz="1800" dirty="0">
+              <a:rPr lang="en-US" dirty="0">
                 <a:effectLst/>
                 <a:latin typeface="Cambria" panose="02040503050406030204" pitchFamily="18" charset="0"/>
                 <a:ea typeface="Calibri" panose="020F0502020204030204" pitchFamily="34" charset="0"/>
@@ -4302,7 +4304,7 @@
               <a:t> I can have rights to the scripts I have uploaded, </a:t>
             </a:r>
             <a:br>
-              <a:rPr lang="en-US" sz="1800" dirty="0">
+              <a:rPr lang="en-US" dirty="0">
                 <a:effectLst/>
                 <a:latin typeface="Cambria" panose="02040503050406030204" pitchFamily="18" charset="0"/>
                 <a:ea typeface="Calibri" panose="020F0502020204030204" pitchFamily="34" charset="0"/>
@@ -4310,7 +4312,7 @@
               </a:rPr>
             </a:br>
             <a:r>
-              <a:rPr lang="en-US" sz="1800" b="1" dirty="0">
+              <a:rPr lang="en-US" b="1" dirty="0">
                 <a:effectLst/>
                 <a:latin typeface="Cambria" panose="02040503050406030204" pitchFamily="18" charset="0"/>
                 <a:ea typeface="Calibri" panose="020F0502020204030204" pitchFamily="34" charset="0"/>
@@ -4319,7 +4321,7 @@
               <a:t>I want to</a:t>
             </a:r>
             <a:r>
-              <a:rPr lang="en-US" sz="1800" dirty="0">
+              <a:rPr lang="en-US" dirty="0">
                 <a:effectLst/>
                 <a:latin typeface="Cambria" panose="02040503050406030204" pitchFamily="18" charset="0"/>
                 <a:ea typeface="Calibri" panose="020F0502020204030204" pitchFamily="34" charset="0"/>
@@ -4327,7 +4329,7 @@
               </a:rPr>
               <a:t> be able to edit and remove them from the database</a:t>
             </a:r>
-            <a:endParaRPr lang="en-US" sz="1800" dirty="0">
+            <a:endParaRPr lang="en-US" dirty="0">
               <a:effectLst/>
               <a:latin typeface="Times New Roman" panose="02020603050405020304" pitchFamily="18" charset="0"/>
               <a:ea typeface="Calibri" panose="020F0502020204030204" pitchFamily="34" charset="0"/>
@@ -4341,7 +4343,7 @@
               </a:spcBef>
             </a:pPr>
             <a:r>
-              <a:rPr lang="en-US" sz="1600" dirty="0">
+              <a:rPr lang="en-US" dirty="0">
                 <a:effectLst/>
                 <a:latin typeface="Cambria" panose="02040503050406030204" pitchFamily="18" charset="0"/>
                 <a:ea typeface="Calibri" panose="020F0502020204030204" pitchFamily="34" charset="0"/>
@@ -4349,7 +4351,7 @@
               </a:rPr>
               <a:t>Story Point(s): 1</a:t>
             </a:r>
-            <a:endParaRPr lang="en-US" sz="1600" dirty="0">
+            <a:endParaRPr lang="en-US" dirty="0">
               <a:effectLst/>
               <a:latin typeface="Times New Roman" panose="02020603050405020304" pitchFamily="18" charset="0"/>
               <a:ea typeface="Calibri" panose="020F0502020204030204" pitchFamily="34" charset="0"/>
@@ -7377,7 +7379,7 @@
               </a:spcBef>
             </a:pPr>
             <a:r>
-              <a:rPr lang="en-US" sz="1800" b="1" dirty="0">
+              <a:rPr lang="en-US" b="1" dirty="0">
                 <a:effectLst/>
                 <a:latin typeface="Cambria" panose="02040503050406030204" pitchFamily="18" charset="0"/>
                 <a:ea typeface="Calibri" panose="020F0502020204030204" pitchFamily="34" charset="0"/>
@@ -7386,7 +7388,7 @@
               <a:t>As a</a:t>
             </a:r>
             <a:r>
-              <a:rPr lang="en-US" sz="1800" dirty="0">
+              <a:rPr lang="en-US" dirty="0">
                 <a:effectLst/>
                 <a:latin typeface="Cambria" panose="02040503050406030204" pitchFamily="18" charset="0"/>
                 <a:ea typeface="Calibri" panose="020F0502020204030204" pitchFamily="34" charset="0"/>
@@ -7395,7 +7397,7 @@
               <a:t> teacher, </a:t>
             </a:r>
             <a:br>
-              <a:rPr lang="en-US" sz="1800" dirty="0">
+              <a:rPr lang="en-US" dirty="0">
                 <a:effectLst/>
                 <a:latin typeface="Cambria" panose="02040503050406030204" pitchFamily="18" charset="0"/>
                 <a:ea typeface="Calibri" panose="020F0502020204030204" pitchFamily="34" charset="0"/>
@@ -7403,7 +7405,7 @@
               </a:rPr>
             </a:br>
             <a:r>
-              <a:rPr lang="en-US" sz="1800" b="1" dirty="0">
+              <a:rPr lang="en-US" b="1" dirty="0">
                 <a:effectLst/>
                 <a:latin typeface="Cambria" panose="02040503050406030204" pitchFamily="18" charset="0"/>
                 <a:ea typeface="Calibri" panose="020F0502020204030204" pitchFamily="34" charset="0"/>
@@ -7412,7 +7414,7 @@
               <a:t>so that </a:t>
             </a:r>
             <a:r>
-              <a:rPr lang="en-US" sz="1800" dirty="0">
+              <a:rPr lang="en-US" dirty="0">
                 <a:effectLst/>
                 <a:latin typeface="Cambria" panose="02040503050406030204" pitchFamily="18" charset="0"/>
                 <a:ea typeface="Calibri" panose="020F0502020204030204" pitchFamily="34" charset="0"/>
@@ -7421,7 +7423,7 @@
               <a:t>I can reply to emails quickly, </a:t>
             </a:r>
             <a:br>
-              <a:rPr lang="en-US" sz="1800" dirty="0">
+              <a:rPr lang="en-US" dirty="0">
                 <a:effectLst/>
                 <a:latin typeface="Cambria" panose="02040503050406030204" pitchFamily="18" charset="0"/>
                 <a:ea typeface="Calibri" panose="020F0502020204030204" pitchFamily="34" charset="0"/>
@@ -7429,7 +7431,7 @@
               </a:rPr>
             </a:br>
             <a:r>
-              <a:rPr lang="en-US" sz="1800" b="1" dirty="0">
+              <a:rPr lang="en-US" b="1" dirty="0">
                 <a:effectLst/>
                 <a:latin typeface="Cambria" panose="02040503050406030204" pitchFamily="18" charset="0"/>
                 <a:ea typeface="Calibri" panose="020F0502020204030204" pitchFamily="34" charset="0"/>
@@ -7438,7 +7440,7 @@
               <a:t>I want to</a:t>
             </a:r>
             <a:r>
-              <a:rPr lang="en-US" sz="1800" dirty="0">
+              <a:rPr lang="en-US" dirty="0">
                 <a:effectLst/>
                 <a:latin typeface="Cambria" panose="02040503050406030204" pitchFamily="18" charset="0"/>
                 <a:ea typeface="Calibri" panose="020F0502020204030204" pitchFamily="34" charset="0"/>
@@ -7454,7 +7456,7 @@
               </a:spcBef>
             </a:pPr>
             <a:r>
-              <a:rPr lang="en-US" sz="1600" dirty="0">
+              <a:rPr lang="en-US" dirty="0">
                 <a:effectLst/>
                 <a:latin typeface="Cambria" panose="02040503050406030204" pitchFamily="18" charset="0"/>
                 <a:ea typeface="Calibri" panose="020F0502020204030204" pitchFamily="34" charset="0"/>
@@ -7472,7 +7474,7 @@
                 <a:spcPts val="0"/>
               </a:spcAft>
             </a:pPr>
-            <a:endParaRPr lang="en-US" sz="1800" dirty="0">
+            <a:endParaRPr lang="en-US" dirty="0">
               <a:latin typeface="Cambria" panose="02040503050406030204" pitchFamily="18" charset="0"/>
               <a:ea typeface="Calibri" panose="020F0502020204030204" pitchFamily="34" charset="0"/>
               <a:cs typeface="Times New Roman" panose="02020603050405020304" pitchFamily="18" charset="0"/>
@@ -7485,7 +7487,7 @@
               </a:spcBef>
             </a:pPr>
             <a:r>
-              <a:rPr lang="en-US" sz="1800" b="1" dirty="0">
+              <a:rPr lang="en-US" b="1" dirty="0">
                 <a:effectLst/>
                 <a:latin typeface="Cambria" panose="02040503050406030204" pitchFamily="18" charset="0"/>
                 <a:ea typeface="Calibri" panose="020F0502020204030204" pitchFamily="34" charset="0"/>
@@ -7494,7 +7496,7 @@
               <a:t>As a </a:t>
             </a:r>
             <a:r>
-              <a:rPr lang="en-US" sz="1800" dirty="0">
+              <a:rPr lang="en-US" dirty="0">
                 <a:effectLst/>
                 <a:latin typeface="Cambria" panose="02040503050406030204" pitchFamily="18" charset="0"/>
                 <a:ea typeface="Calibri" panose="020F0502020204030204" pitchFamily="34" charset="0"/>
@@ -7503,7 +7505,7 @@
               <a:t>student, </a:t>
             </a:r>
             <a:br>
-              <a:rPr lang="en-US" sz="1800" dirty="0">
+              <a:rPr lang="en-US" dirty="0">
                 <a:effectLst/>
                 <a:latin typeface="Cambria" panose="02040503050406030204" pitchFamily="18" charset="0"/>
                 <a:ea typeface="Calibri" panose="020F0502020204030204" pitchFamily="34" charset="0"/>
@@ -7511,7 +7513,7 @@
               </a:rPr>
             </a:br>
             <a:r>
-              <a:rPr lang="en-US" sz="1800" b="1" dirty="0">
+              <a:rPr lang="en-US" b="1" dirty="0">
                 <a:effectLst/>
                 <a:latin typeface="Cambria" panose="02040503050406030204" pitchFamily="18" charset="0"/>
                 <a:ea typeface="Calibri" panose="020F0502020204030204" pitchFamily="34" charset="0"/>
@@ -7520,7 +7522,7 @@
               <a:t>so that</a:t>
             </a:r>
             <a:r>
-              <a:rPr lang="en-US" sz="1800" dirty="0">
+              <a:rPr lang="en-US" dirty="0">
                 <a:effectLst/>
                 <a:latin typeface="Cambria" panose="02040503050406030204" pitchFamily="18" charset="0"/>
                 <a:ea typeface="Calibri" panose="020F0502020204030204" pitchFamily="34" charset="0"/>
@@ -7529,7 +7531,7 @@
               <a:t> I can get to work easily, </a:t>
             </a:r>
             <a:br>
-              <a:rPr lang="en-US" sz="1800" dirty="0">
+              <a:rPr lang="en-US" dirty="0">
                 <a:effectLst/>
                 <a:latin typeface="Cambria" panose="02040503050406030204" pitchFamily="18" charset="0"/>
                 <a:ea typeface="Calibri" panose="020F0502020204030204" pitchFamily="34" charset="0"/>
@@ -7537,7 +7539,7 @@
               </a:rPr>
             </a:br>
             <a:r>
-              <a:rPr lang="en-US" sz="1800" b="1" dirty="0">
+              <a:rPr lang="en-US" b="1" dirty="0">
                 <a:effectLst/>
                 <a:latin typeface="Cambria" panose="02040503050406030204" pitchFamily="18" charset="0"/>
                 <a:ea typeface="Calibri" panose="020F0502020204030204" pitchFamily="34" charset="0"/>
@@ -7546,7 +7548,7 @@
               <a:t>I want to</a:t>
             </a:r>
             <a:r>
-              <a:rPr lang="en-US" sz="1800" dirty="0">
+              <a:rPr lang="en-US" dirty="0">
                 <a:effectLst/>
                 <a:latin typeface="Cambria" panose="02040503050406030204" pitchFamily="18" charset="0"/>
                 <a:ea typeface="Calibri" panose="020F0502020204030204" pitchFamily="34" charset="0"/>
@@ -7555,7 +7557,7 @@
               <a:t> create hotkeys that open up </a:t>
             </a:r>
             <a:r>
-              <a:rPr lang="en-US" sz="1800" dirty="0">
+              <a:rPr lang="en-US" dirty="0">
                 <a:latin typeface="Cambria" panose="02040503050406030204" pitchFamily="18" charset="0"/>
                 <a:ea typeface="Calibri" panose="020F0502020204030204" pitchFamily="34" charset="0"/>
                 <a:cs typeface="Times New Roman" panose="02020603050405020304" pitchFamily="18" charset="0"/>
@@ -7563,7 +7565,7 @@
               <a:t>the </a:t>
             </a:r>
             <a:r>
-              <a:rPr lang="en-US" sz="1800" dirty="0">
+              <a:rPr lang="en-US" dirty="0">
                 <a:effectLst/>
                 <a:latin typeface="Cambria" panose="02040503050406030204" pitchFamily="18" charset="0"/>
                 <a:ea typeface="Calibri" panose="020F0502020204030204" pitchFamily="34" charset="0"/>
@@ -7571,7 +7573,7 @@
               </a:rPr>
               <a:t>applications I use for work.</a:t>
             </a:r>
-            <a:endParaRPr lang="en-US" sz="1800" dirty="0">
+            <a:endParaRPr lang="en-US" dirty="0">
               <a:effectLst/>
               <a:latin typeface="Times New Roman" panose="02020603050405020304" pitchFamily="18" charset="0"/>
               <a:ea typeface="Calibri" panose="020F0502020204030204" pitchFamily="34" charset="0"/>
@@ -7581,7 +7583,7 @@
           <a:p>
             <a:pPr lvl="1"/>
             <a:r>
-              <a:rPr lang="en-US" sz="1600" dirty="0">
+              <a:rPr lang="en-US" dirty="0">
                 <a:effectLst/>
                 <a:latin typeface="Cambria" panose="02040503050406030204" pitchFamily="18" charset="0"/>
                 <a:ea typeface="Calibri" panose="020F0502020204030204" pitchFamily="34" charset="0"/>
@@ -7589,7 +7591,7 @@
               </a:rPr>
               <a:t>Story Point(s): 1 </a:t>
             </a:r>
-            <a:endParaRPr lang="en-US" sz="1600" dirty="0">
+            <a:endParaRPr lang="en-US" dirty="0">
               <a:effectLst/>
               <a:latin typeface="Times New Roman" panose="02020603050405020304" pitchFamily="18" charset="0"/>
               <a:ea typeface="Calibri" panose="020F0502020204030204" pitchFamily="34" charset="0"/>
@@ -7686,7 +7688,7 @@
               </a:spcBef>
             </a:pPr>
             <a:r>
-              <a:rPr lang="en-US" sz="1800" b="1" dirty="0">
+              <a:rPr lang="en-US" b="1" dirty="0">
                 <a:effectLst/>
                 <a:latin typeface="Cambria" panose="02040503050406030204" pitchFamily="18" charset="0"/>
                 <a:ea typeface="Calibri" panose="020F0502020204030204" pitchFamily="34" charset="0"/>
@@ -7695,7 +7697,7 @@
               <a:t>As a</a:t>
             </a:r>
             <a:r>
-              <a:rPr lang="en-US" sz="1800" dirty="0">
+              <a:rPr lang="en-US" dirty="0">
                 <a:effectLst/>
                 <a:latin typeface="Cambria" panose="02040503050406030204" pitchFamily="18" charset="0"/>
                 <a:ea typeface="Calibri" panose="020F0502020204030204" pitchFamily="34" charset="0"/>
@@ -7704,7 +7706,7 @@
               <a:t> student,</a:t>
             </a:r>
             <a:br>
-              <a:rPr lang="en-US" sz="1800" dirty="0">
+              <a:rPr lang="en-US" dirty="0">
                 <a:effectLst/>
                 <a:latin typeface="Cambria" panose="02040503050406030204" pitchFamily="18" charset="0"/>
                 <a:ea typeface="Calibri" panose="020F0502020204030204" pitchFamily="34" charset="0"/>
@@ -7712,7 +7714,7 @@
               </a:rPr>
             </a:br>
             <a:r>
-              <a:rPr lang="en-US" sz="1800" b="1" dirty="0">
+              <a:rPr lang="en-US" b="1" dirty="0">
                 <a:effectLst/>
                 <a:latin typeface="Cambria" panose="02040503050406030204" pitchFamily="18" charset="0"/>
                 <a:ea typeface="Calibri" panose="020F0502020204030204" pitchFamily="34" charset="0"/>
@@ -7721,7 +7723,7 @@
               <a:t>so that</a:t>
             </a:r>
             <a:r>
-              <a:rPr lang="en-US" sz="1800" dirty="0">
+              <a:rPr lang="en-US" dirty="0">
                 <a:effectLst/>
                 <a:latin typeface="Cambria" panose="02040503050406030204" pitchFamily="18" charset="0"/>
                 <a:ea typeface="Calibri" panose="020F0502020204030204" pitchFamily="34" charset="0"/>
@@ -7730,7 +7732,7 @@
               <a:t> I can write my essays faster, </a:t>
             </a:r>
             <a:br>
-              <a:rPr lang="en-US" sz="1800" dirty="0">
+              <a:rPr lang="en-US" dirty="0">
                 <a:effectLst/>
                 <a:latin typeface="Cambria" panose="02040503050406030204" pitchFamily="18" charset="0"/>
                 <a:ea typeface="Calibri" panose="020F0502020204030204" pitchFamily="34" charset="0"/>
@@ -7738,7 +7740,7 @@
               </a:rPr>
             </a:br>
             <a:r>
-              <a:rPr lang="en-US" sz="1800" b="1" dirty="0">
+              <a:rPr lang="en-US" b="1" dirty="0">
                 <a:effectLst/>
                 <a:latin typeface="Cambria" panose="02040503050406030204" pitchFamily="18" charset="0"/>
                 <a:ea typeface="Calibri" panose="020F0502020204030204" pitchFamily="34" charset="0"/>
@@ -7747,7 +7749,7 @@
               <a:t>I want to</a:t>
             </a:r>
             <a:r>
-              <a:rPr lang="en-US" sz="1800" dirty="0">
+              <a:rPr lang="en-US" dirty="0">
                 <a:effectLst/>
                 <a:latin typeface="Cambria" panose="02040503050406030204" pitchFamily="18" charset="0"/>
                 <a:ea typeface="Calibri" panose="020F0502020204030204" pitchFamily="34" charset="0"/>
@@ -7756,7 +7758,7 @@
               <a:t> create </a:t>
             </a:r>
             <a:r>
-              <a:rPr lang="en-US" sz="1800" dirty="0" err="1">
+              <a:rPr lang="en-US" dirty="0" err="1">
                 <a:effectLst/>
                 <a:latin typeface="Cambria" panose="02040503050406030204" pitchFamily="18" charset="0"/>
                 <a:ea typeface="Calibri" panose="020F0502020204030204" pitchFamily="34" charset="0"/>
@@ -7765,7 +7767,7 @@
               <a:t>hotstrings</a:t>
             </a:r>
             <a:r>
-              <a:rPr lang="en-US" sz="1800" dirty="0">
+              <a:rPr lang="en-US" dirty="0">
                 <a:effectLst/>
                 <a:latin typeface="Cambria" panose="02040503050406030204" pitchFamily="18" charset="0"/>
                 <a:ea typeface="Calibri" panose="020F0502020204030204" pitchFamily="34" charset="0"/>
@@ -7781,7 +7783,7 @@
               </a:spcBef>
             </a:pPr>
             <a:r>
-              <a:rPr lang="en-US" sz="1600" dirty="0">
+              <a:rPr lang="en-US" dirty="0">
                 <a:effectLst/>
                 <a:latin typeface="Cambria" panose="02040503050406030204" pitchFamily="18" charset="0"/>
                 <a:ea typeface="Calibri" panose="020F0502020204030204" pitchFamily="34" charset="0"/>
@@ -7797,7 +7799,7 @@
               </a:spcBef>
               <a:buNone/>
             </a:pPr>
-            <a:endParaRPr lang="en-US" sz="1600" dirty="0">
+            <a:endParaRPr lang="en-US" dirty="0">
               <a:effectLst/>
               <a:latin typeface="Times New Roman" panose="02020603050405020304" pitchFamily="18" charset="0"/>
               <a:ea typeface="Calibri" panose="020F0502020204030204" pitchFamily="34" charset="0"/>
@@ -7811,7 +7813,7 @@
               </a:spcBef>
             </a:pPr>
             <a:r>
-              <a:rPr lang="en-US" sz="1800" b="1" dirty="0">
+              <a:rPr lang="en-US" b="1" dirty="0">
                 <a:effectLst/>
                 <a:latin typeface="Cambria" panose="02040503050406030204" pitchFamily="18" charset="0"/>
                 <a:ea typeface="Calibri" panose="020F0502020204030204" pitchFamily="34" charset="0"/>
@@ -7820,7 +7822,7 @@
               <a:t>As a</a:t>
             </a:r>
             <a:r>
-              <a:rPr lang="en-US" sz="1800" dirty="0">
+              <a:rPr lang="en-US" dirty="0">
                 <a:effectLst/>
                 <a:latin typeface="Cambria" panose="02040503050406030204" pitchFamily="18" charset="0"/>
                 <a:ea typeface="Calibri" panose="020F0502020204030204" pitchFamily="34" charset="0"/>
@@ -7829,7 +7831,7 @@
               <a:t> music enjoyer, </a:t>
             </a:r>
             <a:br>
-              <a:rPr lang="en-US" sz="1800" dirty="0">
+              <a:rPr lang="en-US" dirty="0">
                 <a:effectLst/>
                 <a:latin typeface="Cambria" panose="02040503050406030204" pitchFamily="18" charset="0"/>
                 <a:ea typeface="Calibri" panose="020F0502020204030204" pitchFamily="34" charset="0"/>
@@ -7837,7 +7839,7 @@
               </a:rPr>
             </a:br>
             <a:r>
-              <a:rPr lang="en-US" sz="1800" b="1" dirty="0">
+              <a:rPr lang="en-US" b="1" dirty="0">
                 <a:effectLst/>
                 <a:latin typeface="Cambria" panose="02040503050406030204" pitchFamily="18" charset="0"/>
                 <a:ea typeface="Calibri" panose="020F0502020204030204" pitchFamily="34" charset="0"/>
@@ -7846,7 +7848,7 @@
               <a:t>so that</a:t>
             </a:r>
             <a:r>
-              <a:rPr lang="en-US" sz="1800" dirty="0">
+              <a:rPr lang="en-US" dirty="0">
                 <a:effectLst/>
                 <a:latin typeface="Cambria" panose="02040503050406030204" pitchFamily="18" charset="0"/>
                 <a:ea typeface="Calibri" panose="020F0502020204030204" pitchFamily="34" charset="0"/>
@@ -7855,7 +7857,7 @@
               <a:t> I can change my music easier, </a:t>
             </a:r>
             <a:br>
-              <a:rPr lang="en-US" sz="1800" dirty="0">
+              <a:rPr lang="en-US" dirty="0">
                 <a:effectLst/>
                 <a:latin typeface="Cambria" panose="02040503050406030204" pitchFamily="18" charset="0"/>
                 <a:ea typeface="Calibri" panose="020F0502020204030204" pitchFamily="34" charset="0"/>
@@ -7863,7 +7865,7 @@
               </a:rPr>
             </a:br>
             <a:r>
-              <a:rPr lang="en-US" sz="1800" b="1" dirty="0">
+              <a:rPr lang="en-US" b="1" dirty="0">
                 <a:effectLst/>
                 <a:latin typeface="Cambria" panose="02040503050406030204" pitchFamily="18" charset="0"/>
                 <a:ea typeface="Calibri" panose="020F0502020204030204" pitchFamily="34" charset="0"/>
@@ -7872,7 +7874,7 @@
               <a:t>I want to</a:t>
             </a:r>
             <a:r>
-              <a:rPr lang="en-US" sz="1800" dirty="0">
+              <a:rPr lang="en-US" dirty="0">
                 <a:effectLst/>
                 <a:latin typeface="Cambria" panose="02040503050406030204" pitchFamily="18" charset="0"/>
                 <a:ea typeface="Calibri" panose="020F0502020204030204" pitchFamily="34" charset="0"/>
@@ -7888,7 +7890,7 @@
               </a:spcBef>
             </a:pPr>
             <a:r>
-              <a:rPr lang="en-US" sz="1600" dirty="0">
+              <a:rPr lang="en-US" dirty="0">
                 <a:effectLst/>
                 <a:latin typeface="Cambria" panose="02040503050406030204" pitchFamily="18" charset="0"/>
                 <a:ea typeface="Calibri" panose="020F0502020204030204" pitchFamily="34" charset="0"/>
@@ -7984,7 +7986,9 @@
         </p:nvSpPr>
         <p:spPr/>
         <p:txBody>
-          <a:bodyPr/>
+          <a:bodyPr>
+            <a:normAutofit/>
+          </a:bodyPr>
           <a:lstStyle/>
           <a:p>
             <a:pPr>
@@ -7993,7 +7997,7 @@
               </a:spcBef>
             </a:pPr>
             <a:r>
-              <a:rPr lang="en-US" sz="1800" b="1" dirty="0">
+              <a:rPr lang="en-US" b="1" dirty="0">
                 <a:effectLst/>
                 <a:latin typeface="Cambria" panose="02040503050406030204" pitchFamily="18" charset="0"/>
                 <a:ea typeface="Calibri" panose="020F0502020204030204" pitchFamily="34" charset="0"/>
@@ -8002,7 +8006,7 @@
               <a:t>As a</a:t>
             </a:r>
             <a:r>
-              <a:rPr lang="en-US" sz="1800" dirty="0">
+              <a:rPr lang="en-US" dirty="0">
                 <a:effectLst/>
                 <a:latin typeface="Cambria" panose="02040503050406030204" pitchFamily="18" charset="0"/>
                 <a:ea typeface="Calibri" panose="020F0502020204030204" pitchFamily="34" charset="0"/>
@@ -8011,7 +8015,7 @@
               <a:t> user with many scripts, </a:t>
             </a:r>
             <a:br>
-              <a:rPr lang="en-US" sz="1800" dirty="0">
+              <a:rPr lang="en-US" dirty="0">
                 <a:effectLst/>
                 <a:latin typeface="Cambria" panose="02040503050406030204" pitchFamily="18" charset="0"/>
                 <a:ea typeface="Calibri" panose="020F0502020204030204" pitchFamily="34" charset="0"/>
@@ -8019,7 +8023,7 @@
               </a:rPr>
             </a:br>
             <a:r>
-              <a:rPr lang="en-US" sz="1800" b="1" dirty="0">
+              <a:rPr lang="en-US" b="1" dirty="0">
                 <a:effectLst/>
                 <a:latin typeface="Cambria" panose="02040503050406030204" pitchFamily="18" charset="0"/>
                 <a:ea typeface="Calibri" panose="020F0502020204030204" pitchFamily="34" charset="0"/>
@@ -8028,7 +8032,7 @@
               <a:t>so that</a:t>
             </a:r>
             <a:r>
-              <a:rPr lang="en-US" sz="1800" dirty="0">
+              <a:rPr lang="en-US" dirty="0">
                 <a:effectLst/>
                 <a:latin typeface="Cambria" panose="02040503050406030204" pitchFamily="18" charset="0"/>
                 <a:ea typeface="Calibri" panose="020F0502020204030204" pitchFamily="34" charset="0"/>
@@ -8037,7 +8041,7 @@
               <a:t> I can manage what scripts I use at any given time, </a:t>
             </a:r>
             <a:br>
-              <a:rPr lang="en-US" sz="1800" dirty="0">
+              <a:rPr lang="en-US" dirty="0">
                 <a:effectLst/>
                 <a:latin typeface="Cambria" panose="02040503050406030204" pitchFamily="18" charset="0"/>
                 <a:ea typeface="Calibri" panose="020F0502020204030204" pitchFamily="34" charset="0"/>
@@ -8045,7 +8049,7 @@
               </a:rPr>
             </a:br>
             <a:r>
-              <a:rPr lang="en-US" sz="1800" b="1" dirty="0">
+              <a:rPr lang="en-US" b="1" dirty="0">
                 <a:effectLst/>
                 <a:latin typeface="Cambria" panose="02040503050406030204" pitchFamily="18" charset="0"/>
                 <a:ea typeface="Calibri" panose="020F0502020204030204" pitchFamily="34" charset="0"/>
@@ -8054,7 +8058,7 @@
               <a:t>I want to</a:t>
             </a:r>
             <a:r>
-              <a:rPr lang="en-US" sz="1800" dirty="0">
+              <a:rPr lang="en-US" dirty="0">
                 <a:effectLst/>
                 <a:latin typeface="Cambria" panose="02040503050406030204" pitchFamily="18" charset="0"/>
                 <a:ea typeface="Calibri" panose="020F0502020204030204" pitchFamily="34" charset="0"/>
@@ -8070,7 +8074,7 @@
               </a:spcBef>
             </a:pPr>
             <a:r>
-              <a:rPr lang="en-US" sz="1600" dirty="0">
+              <a:rPr lang="en-US" dirty="0">
                 <a:effectLst/>
                 <a:latin typeface="Cambria" panose="02040503050406030204" pitchFamily="18" charset="0"/>
                 <a:ea typeface="Calibri" panose="020F0502020204030204" pitchFamily="34" charset="0"/>
@@ -8078,7 +8082,7 @@
               </a:rPr>
               <a:t>Story Point(s): 2</a:t>
             </a:r>
-            <a:endParaRPr lang="en-US" sz="1600" dirty="0">
+            <a:endParaRPr lang="en-US" dirty="0">
               <a:effectLst/>
               <a:latin typeface="Times New Roman" panose="02020603050405020304" pitchFamily="18" charset="0"/>
               <a:ea typeface="Calibri" panose="020F0502020204030204" pitchFamily="34" charset="0"/>
@@ -8096,7 +8100,7 @@
               <a:buNone/>
             </a:pPr>
             <a:r>
-              <a:rPr lang="en-US" sz="1800" dirty="0">
+              <a:rPr lang="en-US" dirty="0">
                 <a:effectLst/>
                 <a:latin typeface="Cambria" panose="02040503050406030204" pitchFamily="18" charset="0"/>
                 <a:ea typeface="Calibri" panose="020F0502020204030204" pitchFamily="34" charset="0"/>
@@ -8104,7 +8108,7 @@
               </a:rPr>
               <a:t> </a:t>
             </a:r>
-            <a:endParaRPr lang="en-US" sz="1800" dirty="0">
+            <a:endParaRPr lang="en-US" dirty="0">
               <a:effectLst/>
               <a:latin typeface="Times New Roman" panose="02020603050405020304" pitchFamily="18" charset="0"/>
               <a:ea typeface="Calibri" panose="020F0502020204030204" pitchFamily="34" charset="0"/>
@@ -8118,7 +8122,7 @@
               </a:spcBef>
             </a:pPr>
             <a:r>
-              <a:rPr lang="en-US" sz="1800" b="1" dirty="0">
+              <a:rPr lang="en-US" b="1" dirty="0">
                 <a:effectLst/>
                 <a:latin typeface="Cambria" panose="02040503050406030204" pitchFamily="18" charset="0"/>
                 <a:ea typeface="Calibri" panose="020F0502020204030204" pitchFamily="34" charset="0"/>
@@ -8127,7 +8131,7 @@
               <a:t>As a</a:t>
             </a:r>
             <a:r>
-              <a:rPr lang="en-US" sz="1800" dirty="0">
+              <a:rPr lang="en-US" dirty="0">
                 <a:effectLst/>
                 <a:latin typeface="Cambria" panose="02040503050406030204" pitchFamily="18" charset="0"/>
                 <a:ea typeface="Calibri" panose="020F0502020204030204" pitchFamily="34" charset="0"/>
@@ -8136,7 +8140,7 @@
               <a:t> general user, </a:t>
             </a:r>
             <a:br>
-              <a:rPr lang="en-US" sz="1800" dirty="0">
+              <a:rPr lang="en-US" dirty="0">
                 <a:effectLst/>
                 <a:latin typeface="Cambria" panose="02040503050406030204" pitchFamily="18" charset="0"/>
                 <a:ea typeface="Calibri" panose="020F0502020204030204" pitchFamily="34" charset="0"/>
@@ -8144,7 +8148,7 @@
               </a:rPr>
             </a:br>
             <a:r>
-              <a:rPr lang="en-US" sz="1800" b="1" dirty="0">
+              <a:rPr lang="en-US" b="1" dirty="0">
                 <a:effectLst/>
                 <a:latin typeface="Cambria" panose="02040503050406030204" pitchFamily="18" charset="0"/>
                 <a:ea typeface="Calibri" panose="020F0502020204030204" pitchFamily="34" charset="0"/>
@@ -8153,7 +8157,7 @@
               <a:t>so that</a:t>
             </a:r>
             <a:r>
-              <a:rPr lang="en-US" sz="1800" dirty="0">
+              <a:rPr lang="en-US" dirty="0">
                 <a:effectLst/>
                 <a:latin typeface="Cambria" panose="02040503050406030204" pitchFamily="18" charset="0"/>
                 <a:ea typeface="Calibri" panose="020F0502020204030204" pitchFamily="34" charset="0"/>
@@ -8162,7 +8166,7 @@
               <a:t> I can use the scripts I have created, </a:t>
             </a:r>
             <a:br>
-              <a:rPr lang="en-US" sz="1800" dirty="0">
+              <a:rPr lang="en-US" dirty="0">
                 <a:effectLst/>
                 <a:latin typeface="Cambria" panose="02040503050406030204" pitchFamily="18" charset="0"/>
                 <a:ea typeface="Calibri" panose="020F0502020204030204" pitchFamily="34" charset="0"/>
@@ -8170,7 +8174,7 @@
               </a:rPr>
             </a:br>
             <a:r>
-              <a:rPr lang="en-US" sz="1800" b="1" dirty="0">
+              <a:rPr lang="en-US" b="1" dirty="0">
                 <a:effectLst/>
                 <a:latin typeface="Cambria" panose="02040503050406030204" pitchFamily="18" charset="0"/>
                 <a:ea typeface="Calibri" panose="020F0502020204030204" pitchFamily="34" charset="0"/>
@@ -8179,7 +8183,7 @@
               <a:t>I want to</a:t>
             </a:r>
             <a:r>
-              <a:rPr lang="en-US" sz="1800" dirty="0">
+              <a:rPr lang="en-US" dirty="0">
                 <a:effectLst/>
                 <a:latin typeface="Cambria" panose="02040503050406030204" pitchFamily="18" charset="0"/>
                 <a:ea typeface="Calibri" panose="020F0502020204030204" pitchFamily="34" charset="0"/>
@@ -8195,7 +8199,7 @@
               </a:spcBef>
             </a:pPr>
             <a:r>
-              <a:rPr lang="en-US" sz="1600" dirty="0">
+              <a:rPr lang="en-US" dirty="0">
                 <a:effectLst/>
                 <a:latin typeface="Cambria" panose="02040503050406030204" pitchFamily="18" charset="0"/>
                 <a:ea typeface="Calibri" panose="020F0502020204030204" pitchFamily="34" charset="0"/>
@@ -8203,7 +8207,7 @@
               </a:rPr>
               <a:t>Story Point(s): 3</a:t>
             </a:r>
-            <a:endParaRPr lang="en-US" sz="1600" dirty="0">
+            <a:endParaRPr lang="en-US" dirty="0">
               <a:effectLst/>
               <a:latin typeface="Times New Roman" panose="02020603050405020304" pitchFamily="18" charset="0"/>
               <a:ea typeface="Calibri" panose="020F0502020204030204" pitchFamily="34" charset="0"/>
@@ -8288,7 +8292,9 @@
         </p:nvSpPr>
         <p:spPr/>
         <p:txBody>
-          <a:bodyPr/>
+          <a:bodyPr>
+            <a:normAutofit/>
+          </a:bodyPr>
           <a:lstStyle/>
           <a:p>
             <a:pPr>
@@ -8297,7 +8303,7 @@
               </a:spcBef>
             </a:pPr>
             <a:r>
-              <a:rPr lang="en-US" sz="1800" b="1" dirty="0">
+              <a:rPr lang="en-US" b="1" dirty="0">
                 <a:effectLst/>
                 <a:latin typeface="Cambria" panose="02040503050406030204" pitchFamily="18" charset="0"/>
                 <a:ea typeface="Calibri" panose="020F0502020204030204" pitchFamily="34" charset="0"/>
@@ -8306,7 +8312,7 @@
               <a:t>As a</a:t>
             </a:r>
             <a:r>
-              <a:rPr lang="en-US" sz="1800" dirty="0">
+              <a:rPr lang="en-US" dirty="0">
                 <a:effectLst/>
                 <a:latin typeface="Cambria" panose="02040503050406030204" pitchFamily="18" charset="0"/>
                 <a:ea typeface="Calibri" panose="020F0502020204030204" pitchFamily="34" charset="0"/>
@@ -8315,7 +8321,7 @@
               <a:t> gamer, </a:t>
             </a:r>
             <a:br>
-              <a:rPr lang="en-US" sz="1800" dirty="0">
+              <a:rPr lang="en-US" dirty="0">
                 <a:effectLst/>
                 <a:latin typeface="Cambria" panose="02040503050406030204" pitchFamily="18" charset="0"/>
                 <a:ea typeface="Calibri" panose="020F0502020204030204" pitchFamily="34" charset="0"/>
@@ -8323,7 +8329,7 @@
               </a:rPr>
             </a:br>
             <a:r>
-              <a:rPr lang="en-US" sz="1800" b="1" dirty="0">
+              <a:rPr lang="en-US" b="1" dirty="0">
                 <a:effectLst/>
                 <a:latin typeface="Cambria" panose="02040503050406030204" pitchFamily="18" charset="0"/>
                 <a:ea typeface="Calibri" panose="020F0502020204030204" pitchFamily="34" charset="0"/>
@@ -8332,7 +8338,7 @@
               <a:t>so that</a:t>
             </a:r>
             <a:r>
-              <a:rPr lang="en-US" sz="1800" dirty="0">
+              <a:rPr lang="en-US" dirty="0">
                 <a:effectLst/>
                 <a:latin typeface="Cambria" panose="02040503050406030204" pitchFamily="18" charset="0"/>
                 <a:ea typeface="Calibri" panose="020F0502020204030204" pitchFamily="34" charset="0"/>
@@ -8341,7 +8347,7 @@
               <a:t> I can have an advantage in-game, </a:t>
             </a:r>
             <a:br>
-              <a:rPr lang="en-US" sz="1800" dirty="0">
+              <a:rPr lang="en-US" dirty="0">
                 <a:effectLst/>
                 <a:latin typeface="Cambria" panose="02040503050406030204" pitchFamily="18" charset="0"/>
                 <a:ea typeface="Calibri" panose="020F0502020204030204" pitchFamily="34" charset="0"/>
@@ -8349,7 +8355,7 @@
               </a:rPr>
             </a:br>
             <a:r>
-              <a:rPr lang="en-US" sz="1800" b="1" dirty="0">
+              <a:rPr lang="en-US" b="1" dirty="0">
                 <a:effectLst/>
                 <a:latin typeface="Cambria" panose="02040503050406030204" pitchFamily="18" charset="0"/>
                 <a:ea typeface="Calibri" panose="020F0502020204030204" pitchFamily="34" charset="0"/>
@@ -8358,7 +8364,7 @@
               <a:t>I want to</a:t>
             </a:r>
             <a:r>
-              <a:rPr lang="en-US" sz="1800" dirty="0">
+              <a:rPr lang="en-US" dirty="0">
                 <a:effectLst/>
                 <a:latin typeface="Cambria" panose="02040503050406030204" pitchFamily="18" charset="0"/>
                 <a:ea typeface="Calibri" panose="020F0502020204030204" pitchFamily="34" charset="0"/>
@@ -8366,7 +8372,7 @@
               </a:rPr>
               <a:t> create macros where I can save mouse movements and keyboard inputs occurring at specific rates/times/intervals.  </a:t>
             </a:r>
-            <a:endParaRPr lang="en-US" sz="1800" dirty="0">
+            <a:endParaRPr lang="en-US" dirty="0">
               <a:effectLst/>
               <a:latin typeface="Times New Roman" panose="02020603050405020304" pitchFamily="18" charset="0"/>
               <a:ea typeface="Calibri" panose="020F0502020204030204" pitchFamily="34" charset="0"/>
@@ -8380,7 +8386,7 @@
               </a:spcBef>
             </a:pPr>
             <a:r>
-              <a:rPr lang="en-US" sz="1600" dirty="0">
+              <a:rPr lang="en-US" dirty="0">
                 <a:effectLst/>
                 <a:latin typeface="Cambria" panose="02040503050406030204" pitchFamily="18" charset="0"/>
                 <a:ea typeface="Calibri" panose="020F0502020204030204" pitchFamily="34" charset="0"/>
@@ -8388,7 +8394,7 @@
               </a:rPr>
               <a:t>Story Point(s): 3</a:t>
             </a:r>
-            <a:endParaRPr lang="en-US" sz="1600" dirty="0">
+            <a:endParaRPr lang="en-US" dirty="0">
               <a:effectLst/>
               <a:latin typeface="Times New Roman" panose="02020603050405020304" pitchFamily="18" charset="0"/>
               <a:ea typeface="Calibri" panose="020F0502020204030204" pitchFamily="34" charset="0"/>
@@ -8406,7 +8412,7 @@
               <a:buNone/>
             </a:pPr>
             <a:r>
-              <a:rPr lang="en-US" sz="1800" dirty="0">
+              <a:rPr lang="en-US" dirty="0">
                 <a:effectLst/>
                 <a:latin typeface="Cambria" panose="02040503050406030204" pitchFamily="18" charset="0"/>
                 <a:ea typeface="Calibri" panose="020F0502020204030204" pitchFamily="34" charset="0"/>
@@ -8414,7 +8420,7 @@
               </a:rPr>
               <a:t> </a:t>
             </a:r>
-            <a:endParaRPr lang="en-US" sz="1800" dirty="0">
+            <a:endParaRPr lang="en-US" dirty="0">
               <a:effectLst/>
               <a:latin typeface="Times New Roman" panose="02020603050405020304" pitchFamily="18" charset="0"/>
               <a:ea typeface="Calibri" panose="020F0502020204030204" pitchFamily="34" charset="0"/>
@@ -8428,7 +8434,7 @@
               </a:spcBef>
             </a:pPr>
             <a:r>
-              <a:rPr lang="en-US" sz="1800" b="1" dirty="0">
+              <a:rPr lang="en-US" b="1" dirty="0">
                 <a:effectLst/>
                 <a:latin typeface="Cambria" panose="02040503050406030204" pitchFamily="18" charset="0"/>
                 <a:ea typeface="Calibri" panose="020F0502020204030204" pitchFamily="34" charset="0"/>
@@ -8437,7 +8443,7 @@
               <a:t>As a</a:t>
             </a:r>
             <a:r>
-              <a:rPr lang="en-US" sz="1800" dirty="0">
+              <a:rPr lang="en-US" dirty="0">
                 <a:effectLst/>
                 <a:latin typeface="Cambria" panose="02040503050406030204" pitchFamily="18" charset="0"/>
                 <a:ea typeface="Calibri" panose="020F0502020204030204" pitchFamily="34" charset="0"/>
@@ -8446,7 +8452,7 @@
               <a:t> programmer, </a:t>
             </a:r>
             <a:br>
-              <a:rPr lang="en-US" sz="1800" dirty="0">
+              <a:rPr lang="en-US" dirty="0">
                 <a:effectLst/>
                 <a:latin typeface="Cambria" panose="02040503050406030204" pitchFamily="18" charset="0"/>
                 <a:ea typeface="Calibri" panose="020F0502020204030204" pitchFamily="34" charset="0"/>
@@ -8454,7 +8460,7 @@
               </a:rPr>
             </a:br>
             <a:r>
-              <a:rPr lang="en-US" sz="1800" b="1" dirty="0">
+              <a:rPr lang="en-US" b="1" dirty="0">
                 <a:effectLst/>
                 <a:latin typeface="Cambria" panose="02040503050406030204" pitchFamily="18" charset="0"/>
                 <a:ea typeface="Calibri" panose="020F0502020204030204" pitchFamily="34" charset="0"/>
@@ -8463,7 +8469,7 @@
               <a:t>so that</a:t>
             </a:r>
             <a:r>
-              <a:rPr lang="en-US" sz="1800" dirty="0">
+              <a:rPr lang="en-US" dirty="0">
                 <a:effectLst/>
                 <a:latin typeface="Cambria" panose="02040503050406030204" pitchFamily="18" charset="0"/>
                 <a:ea typeface="Calibri" panose="020F0502020204030204" pitchFamily="34" charset="0"/>
@@ -8472,7 +8478,7 @@
               <a:t> I can save and access my progress for any script from any computer,</a:t>
             </a:r>
             <a:br>
-              <a:rPr lang="en-US" sz="1800" dirty="0">
+              <a:rPr lang="en-US" dirty="0">
                 <a:effectLst/>
                 <a:latin typeface="Cambria" panose="02040503050406030204" pitchFamily="18" charset="0"/>
                 <a:ea typeface="Calibri" panose="020F0502020204030204" pitchFamily="34" charset="0"/>
@@ -8480,7 +8486,7 @@
               </a:rPr>
             </a:br>
             <a:r>
-              <a:rPr lang="en-US" sz="1800" b="1" dirty="0">
+              <a:rPr lang="en-US" b="1" dirty="0">
                 <a:effectLst/>
                 <a:latin typeface="Cambria" panose="02040503050406030204" pitchFamily="18" charset="0"/>
                 <a:ea typeface="Calibri" panose="020F0502020204030204" pitchFamily="34" charset="0"/>
@@ -8489,7 +8495,7 @@
               <a:t>I want to</a:t>
             </a:r>
             <a:r>
-              <a:rPr lang="en-US" sz="1800" dirty="0">
+              <a:rPr lang="en-US" dirty="0">
                 <a:effectLst/>
                 <a:latin typeface="Cambria" panose="02040503050406030204" pitchFamily="18" charset="0"/>
                 <a:ea typeface="Calibri" panose="020F0502020204030204" pitchFamily="34" charset="0"/>
@@ -8497,7 +8503,7 @@
               </a:rPr>
               <a:t> be able to upload my scripts to a database. </a:t>
             </a:r>
-            <a:endParaRPr lang="en-US" sz="1800" dirty="0">
+            <a:endParaRPr lang="en-US" dirty="0">
               <a:latin typeface="Cambria" panose="02040503050406030204" pitchFamily="18" charset="0"/>
               <a:ea typeface="Calibri" panose="020F0502020204030204" pitchFamily="34" charset="0"/>
               <a:cs typeface="Times New Roman" panose="02020603050405020304" pitchFamily="18" charset="0"/>
@@ -8510,7 +8516,7 @@
               </a:spcBef>
             </a:pPr>
             <a:r>
-              <a:rPr lang="en-US" sz="1600" dirty="0">
+              <a:rPr lang="en-US" dirty="0">
                 <a:effectLst/>
                 <a:latin typeface="Cambria" panose="02040503050406030204" pitchFamily="18" charset="0"/>
                 <a:ea typeface="Calibri" panose="020F0502020204030204" pitchFamily="34" charset="0"/>
@@ -8518,7 +8524,7 @@
               </a:rPr>
               <a:t>Story Point(s): 3</a:t>
             </a:r>
-            <a:endParaRPr lang="en-US" sz="1600" dirty="0">
+            <a:endParaRPr lang="en-US" dirty="0">
               <a:effectLst/>
               <a:latin typeface="Times New Roman" panose="02020603050405020304" pitchFamily="18" charset="0"/>
               <a:ea typeface="Calibri" panose="020F0502020204030204" pitchFamily="34" charset="0"/>
@@ -8603,7 +8609,9 @@
         </p:nvSpPr>
         <p:spPr/>
         <p:txBody>
-          <a:bodyPr/>
+          <a:bodyPr>
+            <a:normAutofit/>
+          </a:bodyPr>
           <a:lstStyle/>
           <a:p>
             <a:pPr>
@@ -8612,7 +8620,7 @@
               </a:spcBef>
             </a:pPr>
             <a:r>
-              <a:rPr lang="en-US" sz="1800" b="1" dirty="0">
+              <a:rPr lang="en-US" b="1" dirty="0">
                 <a:effectLst/>
                 <a:latin typeface="Cambria" panose="02040503050406030204" pitchFamily="18" charset="0"/>
                 <a:ea typeface="Calibri" panose="020F0502020204030204" pitchFamily="34" charset="0"/>
@@ -8621,7 +8629,7 @@
               <a:t>As a</a:t>
             </a:r>
             <a:r>
-              <a:rPr lang="en-US" sz="1800" dirty="0">
+              <a:rPr lang="en-US" dirty="0">
                 <a:effectLst/>
                 <a:latin typeface="Cambria" panose="02040503050406030204" pitchFamily="18" charset="0"/>
                 <a:ea typeface="Calibri" panose="020F0502020204030204" pitchFamily="34" charset="0"/>
@@ -8630,7 +8638,7 @@
               <a:t> helpful programmer, </a:t>
             </a:r>
             <a:br>
-              <a:rPr lang="en-US" sz="1800" dirty="0">
+              <a:rPr lang="en-US" dirty="0">
                 <a:effectLst/>
                 <a:latin typeface="Cambria" panose="02040503050406030204" pitchFamily="18" charset="0"/>
                 <a:ea typeface="Calibri" panose="020F0502020204030204" pitchFamily="34" charset="0"/>
@@ -8638,7 +8646,7 @@
               </a:rPr>
             </a:br>
             <a:r>
-              <a:rPr lang="en-US" sz="1800" b="1" dirty="0">
+              <a:rPr lang="en-US" b="1" dirty="0">
                 <a:effectLst/>
                 <a:latin typeface="Cambria" panose="02040503050406030204" pitchFamily="18" charset="0"/>
                 <a:ea typeface="Calibri" panose="020F0502020204030204" pitchFamily="34" charset="0"/>
@@ -8647,7 +8655,7 @@
               <a:t>so that</a:t>
             </a:r>
             <a:r>
-              <a:rPr lang="en-US" sz="1800" dirty="0">
+              <a:rPr lang="en-US" dirty="0">
                 <a:effectLst/>
                 <a:latin typeface="Cambria" panose="02040503050406030204" pitchFamily="18" charset="0"/>
                 <a:ea typeface="Calibri" panose="020F0502020204030204" pitchFamily="34" charset="0"/>
@@ -8656,7 +8664,7 @@
               <a:t> I can share my work with other people, </a:t>
             </a:r>
             <a:br>
-              <a:rPr lang="en-US" sz="1800" dirty="0">
+              <a:rPr lang="en-US" dirty="0">
                 <a:effectLst/>
                 <a:latin typeface="Cambria" panose="02040503050406030204" pitchFamily="18" charset="0"/>
                 <a:ea typeface="Calibri" panose="020F0502020204030204" pitchFamily="34" charset="0"/>
@@ -8664,7 +8672,7 @@
               </a:rPr>
             </a:br>
             <a:r>
-              <a:rPr lang="en-US" sz="1800" b="1" dirty="0">
+              <a:rPr lang="en-US" b="1" dirty="0">
                 <a:effectLst/>
                 <a:latin typeface="Cambria" panose="02040503050406030204" pitchFamily="18" charset="0"/>
                 <a:ea typeface="Calibri" panose="020F0502020204030204" pitchFamily="34" charset="0"/>
@@ -8673,7 +8681,7 @@
               <a:t>I want to</a:t>
             </a:r>
             <a:r>
-              <a:rPr lang="en-US" sz="1800" dirty="0">
+              <a:rPr lang="en-US" dirty="0">
                 <a:effectLst/>
                 <a:latin typeface="Cambria" panose="02040503050406030204" pitchFamily="18" charset="0"/>
                 <a:ea typeface="Calibri" panose="020F0502020204030204" pitchFamily="34" charset="0"/>
@@ -8681,7 +8689,7 @@
               </a:rPr>
               <a:t> make my scripts accessible to the community through a community accessible list of scripts. </a:t>
             </a:r>
-            <a:endParaRPr lang="en-US" sz="1800" dirty="0">
+            <a:endParaRPr lang="en-US" dirty="0">
               <a:effectLst/>
               <a:latin typeface="Times New Roman" panose="02020603050405020304" pitchFamily="18" charset="0"/>
               <a:ea typeface="Calibri" panose="020F0502020204030204" pitchFamily="34" charset="0"/>
@@ -8695,7 +8703,7 @@
               </a:spcBef>
             </a:pPr>
             <a:r>
-              <a:rPr lang="en-US" sz="1600" dirty="0">
+              <a:rPr lang="en-US" dirty="0">
                 <a:effectLst/>
                 <a:latin typeface="Cambria" panose="02040503050406030204" pitchFamily="18" charset="0"/>
                 <a:ea typeface="Calibri" panose="020F0502020204030204" pitchFamily="34" charset="0"/>
@@ -8703,7 +8711,7 @@
               </a:rPr>
               <a:t>Story Point(s): 1</a:t>
             </a:r>
-            <a:endParaRPr lang="en-US" sz="1600" dirty="0">
+            <a:endParaRPr lang="en-US" dirty="0">
               <a:effectLst/>
               <a:latin typeface="Times New Roman" panose="02020603050405020304" pitchFamily="18" charset="0"/>
               <a:ea typeface="Calibri" panose="020F0502020204030204" pitchFamily="34" charset="0"/>
@@ -8720,7 +8728,7 @@
               </a:spcAft>
               <a:buNone/>
             </a:pPr>
-            <a:endParaRPr lang="en-US" sz="1800" dirty="0">
+            <a:endParaRPr lang="en-US" dirty="0">
               <a:effectLst/>
               <a:latin typeface="Times New Roman" panose="02020603050405020304" pitchFamily="18" charset="0"/>
               <a:ea typeface="Calibri" panose="020F0502020204030204" pitchFamily="34" charset="0"/>
@@ -8734,7 +8742,7 @@
               </a:spcBef>
             </a:pPr>
             <a:r>
-              <a:rPr lang="en-US" sz="1800" b="1" dirty="0">
+              <a:rPr lang="en-US" b="1" dirty="0">
                 <a:effectLst/>
                 <a:latin typeface="Cambria" panose="02040503050406030204" pitchFamily="18" charset="0"/>
                 <a:ea typeface="Calibri" panose="020F0502020204030204" pitchFamily="34" charset="0"/>
@@ -8743,7 +8751,7 @@
               <a:t>As an</a:t>
             </a:r>
             <a:r>
-              <a:rPr lang="en-US" sz="1800" dirty="0">
+              <a:rPr lang="en-US" dirty="0">
                 <a:effectLst/>
                 <a:latin typeface="Cambria" panose="02040503050406030204" pitchFamily="18" charset="0"/>
                 <a:ea typeface="Calibri" panose="020F0502020204030204" pitchFamily="34" charset="0"/>
@@ -8752,7 +8760,7 @@
               <a:t> inexperienced user, </a:t>
             </a:r>
             <a:br>
-              <a:rPr lang="en-US" sz="1800" dirty="0">
+              <a:rPr lang="en-US" dirty="0">
                 <a:effectLst/>
                 <a:latin typeface="Cambria" panose="02040503050406030204" pitchFamily="18" charset="0"/>
                 <a:ea typeface="Calibri" panose="020F0502020204030204" pitchFamily="34" charset="0"/>
@@ -8760,7 +8768,7 @@
               </a:rPr>
             </a:br>
             <a:r>
-              <a:rPr lang="en-US" sz="1800" b="1" dirty="0">
+              <a:rPr lang="en-US" b="1" dirty="0">
                 <a:effectLst/>
                 <a:latin typeface="Cambria" panose="02040503050406030204" pitchFamily="18" charset="0"/>
                 <a:ea typeface="Calibri" panose="020F0502020204030204" pitchFamily="34" charset="0"/>
@@ -8769,7 +8777,7 @@
               <a:t>so that</a:t>
             </a:r>
             <a:r>
-              <a:rPr lang="en-US" sz="1800" dirty="0">
+              <a:rPr lang="en-US" dirty="0">
                 <a:effectLst/>
                 <a:latin typeface="Cambria" panose="02040503050406030204" pitchFamily="18" charset="0"/>
                 <a:ea typeface="Calibri" panose="020F0502020204030204" pitchFamily="34" charset="0"/>
@@ -8778,7 +8786,7 @@
               <a:t> I can get complicated functionality that I cannot program myself, </a:t>
             </a:r>
             <a:br>
-              <a:rPr lang="en-US" sz="1800" dirty="0">
+              <a:rPr lang="en-US" dirty="0">
                 <a:effectLst/>
                 <a:latin typeface="Cambria" panose="02040503050406030204" pitchFamily="18" charset="0"/>
                 <a:ea typeface="Calibri" panose="020F0502020204030204" pitchFamily="34" charset="0"/>
@@ -8786,7 +8794,7 @@
               </a:rPr>
             </a:br>
             <a:r>
-              <a:rPr lang="en-US" sz="1800" b="1" dirty="0">
+              <a:rPr lang="en-US" b="1" dirty="0">
                 <a:effectLst/>
                 <a:latin typeface="Cambria" panose="02040503050406030204" pitchFamily="18" charset="0"/>
                 <a:ea typeface="Calibri" panose="020F0502020204030204" pitchFamily="34" charset="0"/>
@@ -8795,7 +8803,7 @@
               <a:t>I want to</a:t>
             </a:r>
             <a:r>
-              <a:rPr lang="en-US" sz="1800" dirty="0">
+              <a:rPr lang="en-US" dirty="0">
                 <a:effectLst/>
                 <a:latin typeface="Cambria" panose="02040503050406030204" pitchFamily="18" charset="0"/>
                 <a:ea typeface="Calibri" panose="020F0502020204030204" pitchFamily="34" charset="0"/>
@@ -8803,7 +8811,7 @@
               </a:rPr>
               <a:t> be able to search for scripts from the community by name. </a:t>
             </a:r>
-            <a:endParaRPr lang="en-US" sz="1800" dirty="0">
+            <a:endParaRPr lang="en-US" dirty="0">
               <a:effectLst/>
               <a:latin typeface="Times New Roman" panose="02020603050405020304" pitchFamily="18" charset="0"/>
               <a:ea typeface="Calibri" panose="020F0502020204030204" pitchFamily="34" charset="0"/>
@@ -8817,7 +8825,7 @@
               </a:spcBef>
             </a:pPr>
             <a:r>
-              <a:rPr lang="en-US" sz="1600" dirty="0">
+              <a:rPr lang="en-US" dirty="0">
                 <a:effectLst/>
                 <a:latin typeface="Cambria" panose="02040503050406030204" pitchFamily="18" charset="0"/>
                 <a:ea typeface="Calibri" panose="020F0502020204030204" pitchFamily="34" charset="0"/>
@@ -8825,7 +8833,7 @@
               </a:rPr>
               <a:t>Story Point(s): 1</a:t>
             </a:r>
-            <a:endParaRPr lang="en-US" sz="1600" dirty="0">
+            <a:endParaRPr lang="en-US" dirty="0">
               <a:effectLst/>
               <a:latin typeface="Times New Roman" panose="02020603050405020304" pitchFamily="18" charset="0"/>
               <a:ea typeface="Calibri" panose="020F0502020204030204" pitchFamily="34" charset="0"/>
@@ -8910,7 +8918,9 @@
         </p:nvSpPr>
         <p:spPr/>
         <p:txBody>
-          <a:bodyPr/>
+          <a:bodyPr>
+            <a:normAutofit/>
+          </a:bodyPr>
           <a:lstStyle/>
           <a:p>
             <a:pPr>
@@ -8919,7 +8929,7 @@
               </a:spcBef>
             </a:pPr>
             <a:r>
-              <a:rPr lang="en-US" sz="1800" b="1" dirty="0">
+              <a:rPr lang="en-US" b="1" dirty="0">
                 <a:effectLst/>
                 <a:latin typeface="Cambria" panose="02040503050406030204" pitchFamily="18" charset="0"/>
                 <a:ea typeface="Calibri" panose="020F0502020204030204" pitchFamily="34" charset="0"/>
@@ -8928,7 +8938,7 @@
               <a:t>As a</a:t>
             </a:r>
             <a:r>
-              <a:rPr lang="en-US" sz="1800" dirty="0">
+              <a:rPr lang="en-US" dirty="0">
                 <a:effectLst/>
                 <a:latin typeface="Cambria" panose="02040503050406030204" pitchFamily="18" charset="0"/>
                 <a:ea typeface="Calibri" panose="020F0502020204030204" pitchFamily="34" charset="0"/>
@@ -8937,7 +8947,7 @@
               <a:t> more advanced user, </a:t>
             </a:r>
             <a:br>
-              <a:rPr lang="en-US" sz="1800" dirty="0">
+              <a:rPr lang="en-US" dirty="0">
                 <a:effectLst/>
                 <a:latin typeface="Cambria" panose="02040503050406030204" pitchFamily="18" charset="0"/>
                 <a:ea typeface="Calibri" panose="020F0502020204030204" pitchFamily="34" charset="0"/>
@@ -8945,7 +8955,7 @@
               </a:rPr>
             </a:br>
             <a:r>
-              <a:rPr lang="en-US" sz="1800" b="1" dirty="0">
+              <a:rPr lang="en-US" b="1" dirty="0">
                 <a:effectLst/>
                 <a:latin typeface="Cambria" panose="02040503050406030204" pitchFamily="18" charset="0"/>
                 <a:ea typeface="Calibri" panose="020F0502020204030204" pitchFamily="34" charset="0"/>
@@ -8954,7 +8964,7 @@
               <a:t>so that</a:t>
             </a:r>
             <a:r>
-              <a:rPr lang="en-US" sz="1800" dirty="0">
+              <a:rPr lang="en-US" dirty="0">
                 <a:effectLst/>
                 <a:latin typeface="Cambria" panose="02040503050406030204" pitchFamily="18" charset="0"/>
                 <a:ea typeface="Calibri" panose="020F0502020204030204" pitchFamily="34" charset="0"/>
@@ -8963,7 +8973,7 @@
               <a:t> I can write more advanced scripts, </a:t>
             </a:r>
             <a:br>
-              <a:rPr lang="en-US" sz="1800" dirty="0">
+              <a:rPr lang="en-US" dirty="0">
                 <a:effectLst/>
                 <a:latin typeface="Cambria" panose="02040503050406030204" pitchFamily="18" charset="0"/>
                 <a:ea typeface="Calibri" panose="020F0502020204030204" pitchFamily="34" charset="0"/>
@@ -8971,7 +8981,7 @@
               </a:rPr>
             </a:br>
             <a:r>
-              <a:rPr lang="en-US" sz="1800" b="1" dirty="0">
+              <a:rPr lang="en-US" b="1" dirty="0">
                 <a:effectLst/>
                 <a:latin typeface="Cambria" panose="02040503050406030204" pitchFamily="18" charset="0"/>
                 <a:ea typeface="Calibri" panose="020F0502020204030204" pitchFamily="34" charset="0"/>
@@ -8980,7 +8990,7 @@
               <a:t>I want to</a:t>
             </a:r>
             <a:r>
-              <a:rPr lang="en-US" sz="1800" dirty="0">
+              <a:rPr lang="en-US" dirty="0">
                 <a:effectLst/>
                 <a:latin typeface="Cambria" panose="02040503050406030204" pitchFamily="18" charset="0"/>
                 <a:ea typeface="Calibri" panose="020F0502020204030204" pitchFamily="34" charset="0"/>
@@ -8996,7 +9006,7 @@
               </a:spcBef>
             </a:pPr>
             <a:r>
-              <a:rPr lang="en-US" sz="1600" dirty="0">
+              <a:rPr lang="en-US" dirty="0">
                 <a:effectLst/>
                 <a:latin typeface="Cambria" panose="02040503050406030204" pitchFamily="18" charset="0"/>
                 <a:ea typeface="Calibri" panose="020F0502020204030204" pitchFamily="34" charset="0"/>
@@ -9004,7 +9014,7 @@
               </a:rPr>
               <a:t>Story Point(s): 2</a:t>
             </a:r>
-            <a:endParaRPr lang="en-US" sz="1600" dirty="0">
+            <a:endParaRPr lang="en-US" dirty="0">
               <a:effectLst/>
               <a:latin typeface="Times New Roman" panose="02020603050405020304" pitchFamily="18" charset="0"/>
               <a:ea typeface="Calibri" panose="020F0502020204030204" pitchFamily="34" charset="0"/>
@@ -9021,7 +9031,7 @@
               </a:spcAft>
               <a:buNone/>
             </a:pPr>
-            <a:endParaRPr lang="en-US" sz="1800" dirty="0">
+            <a:endParaRPr lang="en-US" dirty="0">
               <a:effectLst/>
               <a:latin typeface="Times New Roman" panose="02020603050405020304" pitchFamily="18" charset="0"/>
               <a:ea typeface="Calibri" panose="020F0502020204030204" pitchFamily="34" charset="0"/>
@@ -9035,7 +9045,7 @@
               </a:spcBef>
             </a:pPr>
             <a:r>
-              <a:rPr lang="en-US" sz="1800" b="1" dirty="0">
+              <a:rPr lang="en-US" b="1" dirty="0">
                 <a:effectLst/>
                 <a:latin typeface="Cambria" panose="02040503050406030204" pitchFamily="18" charset="0"/>
                 <a:ea typeface="Calibri" panose="020F0502020204030204" pitchFamily="34" charset="0"/>
@@ -9044,7 +9054,7 @@
               <a:t>As a</a:t>
             </a:r>
             <a:r>
-              <a:rPr lang="en-US" sz="1800" dirty="0">
+              <a:rPr lang="en-US" dirty="0">
                 <a:effectLst/>
                 <a:latin typeface="Cambria" panose="02040503050406030204" pitchFamily="18" charset="0"/>
                 <a:ea typeface="Calibri" panose="020F0502020204030204" pitchFamily="34" charset="0"/>
@@ -9053,7 +9063,7 @@
               <a:t> programmer, </a:t>
             </a:r>
             <a:br>
-              <a:rPr lang="en-US" sz="1800" dirty="0">
+              <a:rPr lang="en-US" dirty="0">
                 <a:effectLst/>
                 <a:latin typeface="Cambria" panose="02040503050406030204" pitchFamily="18" charset="0"/>
                 <a:ea typeface="Calibri" panose="020F0502020204030204" pitchFamily="34" charset="0"/>
@@ -9061,7 +9071,7 @@
               </a:rPr>
             </a:br>
             <a:r>
-              <a:rPr lang="en-US" sz="1800" b="1" dirty="0">
+              <a:rPr lang="en-US" b="1" dirty="0">
                 <a:effectLst/>
                 <a:latin typeface="Cambria" panose="02040503050406030204" pitchFamily="18" charset="0"/>
                 <a:ea typeface="Calibri" panose="020F0502020204030204" pitchFamily="34" charset="0"/>
@@ -9070,7 +9080,7 @@
               <a:t>so that</a:t>
             </a:r>
             <a:r>
-              <a:rPr lang="en-US" sz="1800" dirty="0">
+              <a:rPr lang="en-US" dirty="0">
                 <a:effectLst/>
                 <a:latin typeface="Cambria" panose="02040503050406030204" pitchFamily="18" charset="0"/>
                 <a:ea typeface="Calibri" panose="020F0502020204030204" pitchFamily="34" charset="0"/>
@@ -9079,7 +9089,7 @@
               <a:t> I can upload scripts to the database, </a:t>
             </a:r>
             <a:br>
-              <a:rPr lang="en-US" sz="1800" dirty="0">
+              <a:rPr lang="en-US" dirty="0">
                 <a:effectLst/>
                 <a:latin typeface="Cambria" panose="02040503050406030204" pitchFamily="18" charset="0"/>
                 <a:ea typeface="Calibri" panose="020F0502020204030204" pitchFamily="34" charset="0"/>
@@ -9087,7 +9097,7 @@
               </a:rPr>
             </a:br>
             <a:r>
-              <a:rPr lang="en-US" sz="1800" b="1" dirty="0">
+              <a:rPr lang="en-US" b="1" dirty="0">
                 <a:effectLst/>
                 <a:latin typeface="Cambria" panose="02040503050406030204" pitchFamily="18" charset="0"/>
                 <a:ea typeface="Calibri" panose="020F0502020204030204" pitchFamily="34" charset="0"/>
@@ -9096,7 +9106,7 @@
               <a:t>I want</a:t>
             </a:r>
             <a:r>
-              <a:rPr lang="en-US" sz="1800" dirty="0">
+              <a:rPr lang="en-US" dirty="0">
                 <a:effectLst/>
                 <a:latin typeface="Cambria" panose="02040503050406030204" pitchFamily="18" charset="0"/>
                 <a:ea typeface="Calibri" panose="020F0502020204030204" pitchFamily="34" charset="0"/>
@@ -9112,7 +9122,7 @@
               </a:spcBef>
             </a:pPr>
             <a:r>
-              <a:rPr lang="en-US" sz="1600" dirty="0">
+              <a:rPr lang="en-US" dirty="0">
                 <a:effectLst/>
                 <a:latin typeface="Cambria" panose="02040503050406030204" pitchFamily="18" charset="0"/>
                 <a:ea typeface="Calibri" panose="020F0502020204030204" pitchFamily="34" charset="0"/>
@@ -9120,7 +9130,7 @@
               </a:rPr>
               <a:t>Story Point(s): 3</a:t>
             </a:r>
-            <a:endParaRPr lang="en-US" sz="1600" dirty="0">
+            <a:endParaRPr lang="en-US" dirty="0">
               <a:effectLst/>
               <a:latin typeface="Times New Roman" panose="02020603050405020304" pitchFamily="18" charset="0"/>
               <a:ea typeface="Calibri" panose="020F0502020204030204" pitchFamily="34" charset="0"/>
@@ -9926,6 +9936,21 @@
 </file>
 
 <file path=customXml/item1.xml><?xml version="1.0" encoding="utf-8"?>
+<p:properties xmlns:p="http://schemas.microsoft.com/office/2006/metadata/properties" xmlns:xsi="http://www.w3.org/2001/XMLSchema-instance" xmlns:pc="http://schemas.microsoft.com/office/infopath/2007/PartnerControls">
+  <documentManagement/>
+</p:properties>
+</file>
+
+<file path=customXml/item2.xml><?xml version="1.0" encoding="utf-8"?>
+<?mso-contentType ?>
+<FormTemplates xmlns="http://schemas.microsoft.com/sharepoint/v3/contenttype/forms">
+  <Display>DocumentLibraryForm</Display>
+  <Edit>DocumentLibraryForm</Edit>
+  <New>DocumentLibraryForm</New>
+</FormTemplates>
+</file>
+
+<file path=customXml/item3.xml><?xml version="1.0" encoding="utf-8"?>
 <ct:contentTypeSchema xmlns:ct="http://schemas.microsoft.com/office/2006/metadata/contentType" xmlns:ma="http://schemas.microsoft.com/office/2006/metadata/properties/metaAttributes" ct:_="" ma:_="" ma:contentTypeName="Document" ma:contentTypeID="0x010100C4EAF0FAAD63974C9F0ED0024803E76E" ma:contentTypeVersion="5" ma:contentTypeDescription="Create a new document." ma:contentTypeScope="" ma:versionID="57e2408e1573f17beb2f9b942327c50e">
   <xsd:schema xmlns:xsd="http://www.w3.org/2001/XMLSchema" xmlns:xs="http://www.w3.org/2001/XMLSchema" xmlns:p="http://schemas.microsoft.com/office/2006/metadata/properties" xmlns:ns3="422d3d89-0a6c-4fcc-be7a-02bb2bcc390c" xmlns:ns4="7b8c18a8-6b9c-407a-aab5-933237a193b4" targetNamespace="http://schemas.microsoft.com/office/2006/metadata/properties" ma:root="true" ma:fieldsID="acfe639b8731e51e665953349c141bc1" ns3:_="" ns4:_="">
     <xsd:import namespace="422d3d89-0a6c-4fcc-be7a-02bb2bcc390c"/>
@@ -10096,22 +10121,32 @@
 </ct:contentTypeSchema>
 </file>
 
-<file path=customXml/item2.xml><?xml version="1.0" encoding="utf-8"?>
-<?mso-contentType ?>
-<FormTemplates xmlns="http://schemas.microsoft.com/sharepoint/v3/contenttype/forms">
-  <Display>DocumentLibraryForm</Display>
-  <Edit>DocumentLibraryForm</Edit>
-  <New>DocumentLibraryForm</New>
-</FormTemplates>
+<file path=customXml/itemProps1.xml><?xml version="1.0" encoding="utf-8"?>
+<ds:datastoreItem xmlns:ds="http://schemas.openxmlformats.org/officeDocument/2006/customXml" ds:itemID="{C7E67B52-EB16-45E9-85E8-F97407C0431C}">
+  <ds:schemaRefs>
+    <ds:schemaRef ds:uri="http://purl.org/dc/terms/"/>
+    <ds:schemaRef ds:uri="http://schemas.openxmlformats.org/package/2006/metadata/core-properties"/>
+    <ds:schemaRef ds:uri="422d3d89-0a6c-4fcc-be7a-02bb2bcc390c"/>
+    <ds:schemaRef ds:uri="http://purl.org/dc/dcmitype/"/>
+    <ds:schemaRef ds:uri="http://schemas.microsoft.com/office/infopath/2007/PartnerControls"/>
+    <ds:schemaRef ds:uri="http://schemas.microsoft.com/office/2006/documentManagement/types"/>
+    <ds:schemaRef ds:uri="http://purl.org/dc/elements/1.1/"/>
+    <ds:schemaRef ds:uri="http://schemas.microsoft.com/office/2006/metadata/properties"/>
+    <ds:schemaRef ds:uri="7b8c18a8-6b9c-407a-aab5-933237a193b4"/>
+    <ds:schemaRef ds:uri="http://www.w3.org/XML/1998/namespace"/>
+  </ds:schemaRefs>
+</ds:datastoreItem>
 </file>
 
-<file path=customXml/item3.xml><?xml version="1.0" encoding="utf-8"?>
-<p:properties xmlns:p="http://schemas.microsoft.com/office/2006/metadata/properties" xmlns:xsi="http://www.w3.org/2001/XMLSchema-instance" xmlns:pc="http://schemas.microsoft.com/office/infopath/2007/PartnerControls">
-  <documentManagement/>
-</p:properties>
+<file path=customXml/itemProps2.xml><?xml version="1.0" encoding="utf-8"?>
+<ds:datastoreItem xmlns:ds="http://schemas.openxmlformats.org/officeDocument/2006/customXml" ds:itemID="{04A9154E-231E-4CB2-AC8C-7B014F34E538}">
+  <ds:schemaRefs>
+    <ds:schemaRef ds:uri="http://schemas.microsoft.com/sharepoint/v3/contenttype/forms"/>
+  </ds:schemaRefs>
+</ds:datastoreItem>
 </file>
 
-<file path=customXml/itemProps1.xml><?xml version="1.0" encoding="utf-8"?>
+<file path=customXml/itemProps3.xml><?xml version="1.0" encoding="utf-8"?>
 <ds:datastoreItem xmlns:ds="http://schemas.openxmlformats.org/officeDocument/2006/customXml" ds:itemID="{B1E8F52B-5A0A-4FED-9906-D1D498F3FFFA}">
   <ds:schemaRefs>
     <ds:schemaRef ds:uri="http://schemas.microsoft.com/office/2006/metadata/contentType"/>
@@ -10128,29 +10163,4 @@
     <ds:schemaRef ds:uri="http://schemas.microsoft.com/internal/obd"/>
   </ds:schemaRefs>
 </ds:datastoreItem>
-</file>
-
-<file path=customXml/itemProps2.xml><?xml version="1.0" encoding="utf-8"?>
-<ds:datastoreItem xmlns:ds="http://schemas.openxmlformats.org/officeDocument/2006/customXml" ds:itemID="{04A9154E-231E-4CB2-AC8C-7B014F34E538}">
-  <ds:schemaRefs>
-    <ds:schemaRef ds:uri="http://schemas.microsoft.com/sharepoint/v3/contenttype/forms"/>
-  </ds:schemaRefs>
-</ds:datastoreItem>
-</file>
-
-<file path=customXml/itemProps3.xml><?xml version="1.0" encoding="utf-8"?>
-<ds:datastoreItem xmlns:ds="http://schemas.openxmlformats.org/officeDocument/2006/customXml" ds:itemID="{C7E67B52-EB16-45E9-85E8-F97407C0431C}">
-  <ds:schemaRefs>
-    <ds:schemaRef ds:uri="http://purl.org/dc/terms/"/>
-    <ds:schemaRef ds:uri="http://schemas.openxmlformats.org/package/2006/metadata/core-properties"/>
-    <ds:schemaRef ds:uri="422d3d89-0a6c-4fcc-be7a-02bb2bcc390c"/>
-    <ds:schemaRef ds:uri="http://purl.org/dc/dcmitype/"/>
-    <ds:schemaRef ds:uri="http://schemas.microsoft.com/office/infopath/2007/PartnerControls"/>
-    <ds:schemaRef ds:uri="http://schemas.microsoft.com/office/2006/documentManagement/types"/>
-    <ds:schemaRef ds:uri="http://purl.org/dc/elements/1.1/"/>
-    <ds:schemaRef ds:uri="http://schemas.microsoft.com/office/2006/metadata/properties"/>
-    <ds:schemaRef ds:uri="7b8c18a8-6b9c-407a-aab5-933237a193b4"/>
-    <ds:schemaRef ds:uri="http://www.w3.org/XML/1998/namespace"/>
-  </ds:schemaRefs>
-</ds:datastoreItem>
 </file>
</xml_diff>